<commit_message>
Missing only functions constructor
</commit_message>
<xml_diff>
--- a/08_Javascript_Classes.pptx
+++ b/08_Javascript_Classes.pptx
@@ -5,7 +5,7 @@
     <p:sldMasterId id="2147483805" r:id="rId4"/>
   </p:sldMasterIdLst>
   <p:notesMasterIdLst>
-    <p:notesMasterId r:id="rId52"/>
+    <p:notesMasterId r:id="rId59"/>
   </p:notesMasterIdLst>
   <p:sldIdLst>
     <p:sldId id="276" r:id="rId5"/>
@@ -54,7 +54,14 @@
     <p:sldId id="328" r:id="rId48"/>
     <p:sldId id="329" r:id="rId49"/>
     <p:sldId id="331" r:id="rId50"/>
-    <p:sldId id="322" r:id="rId51"/>
+    <p:sldId id="332" r:id="rId51"/>
+    <p:sldId id="333" r:id="rId52"/>
+    <p:sldId id="334" r:id="rId53"/>
+    <p:sldId id="336" r:id="rId54"/>
+    <p:sldId id="337" r:id="rId55"/>
+    <p:sldId id="339" r:id="rId56"/>
+    <p:sldId id="338" r:id="rId57"/>
+    <p:sldId id="322" r:id="rId58"/>
   </p:sldIdLst>
   <p:sldSz cx="12192000" cy="6858000"/>
   <p:notesSz cx="6858000" cy="9144000"/>
@@ -6889,7 +6896,311 @@
     </p:spTree>
     <p:extLst>
       <p:ext uri="{BB962C8B-B14F-4D97-AF65-F5344CB8AC3E}">
-        <p14:creationId xmlns:p14="http://schemas.microsoft.com/office/powerpoint/2010/main" val="3980331847"/>
+        <p14:creationId xmlns:p14="http://schemas.microsoft.com/office/powerpoint/2010/main" val="3605263861"/>
+      </p:ext>
+    </p:extLst>
+  </p:cSld>
+  <p:clrMapOvr>
+    <a:masterClrMapping/>
+  </p:clrMapOvr>
+</p:notes>
+</file>
+
+<file path=ppt/notesSlides/notesSlide48.xml><?xml version="1.0" encoding="utf-8"?>
+<p:notes xmlns:a="http://schemas.openxmlformats.org/drawingml/2006/main" xmlns:r="http://schemas.openxmlformats.org/officeDocument/2006/relationships" xmlns:p="http://schemas.openxmlformats.org/presentationml/2006/main">
+  <p:cSld>
+    <p:spTree>
+      <p:nvGrpSpPr>
+        <p:cNvPr id="1" name=""/>
+        <p:cNvGrpSpPr/>
+        <p:nvPr/>
+      </p:nvGrpSpPr>
+      <p:grpSpPr>
+        <a:xfrm>
+          <a:off x="0" y="0"/>
+          <a:ext cx="0" cy="0"/>
+          <a:chOff x="0" y="0"/>
+          <a:chExt cx="0" cy="0"/>
+        </a:xfrm>
+      </p:grpSpPr>
+      <p:sp>
+        <p:nvSpPr>
+          <p:cNvPr id="2" name="Slide Image Placeholder 1"/>
+          <p:cNvSpPr>
+            <a:spLocks noGrp="1" noRot="1" noChangeAspect="1"/>
+          </p:cNvSpPr>
+          <p:nvPr>
+            <p:ph type="sldImg"/>
+          </p:nvPr>
+        </p:nvSpPr>
+        <p:spPr/>
+      </p:sp>
+      <p:sp>
+        <p:nvSpPr>
+          <p:cNvPr id="3" name="Notes Placeholder 2"/>
+          <p:cNvSpPr>
+            <a:spLocks noGrp="1"/>
+          </p:cNvSpPr>
+          <p:nvPr>
+            <p:ph type="body" idx="1"/>
+          </p:nvPr>
+        </p:nvSpPr>
+        <p:spPr/>
+        <p:txBody>
+          <a:bodyPr/>
+          <a:lstStyle/>
+          <a:p>
+            <a:pPr algn="just"/>
+            <a:r>
+              <a:rPr lang="en-US" dirty="0"/>
+              <a:t>Sorry for interrupting the story, but I need to introduce some basic terminology.</a:t>
+            </a:r>
+          </a:p>
+          <a:p>
+            <a:pPr algn="just"/>
+            <a:endParaRPr lang="en-US" dirty="0"/>
+          </a:p>
+          <a:p>
+            <a:pPr algn="just"/>
+            <a:r>
+              <a:rPr lang="en-US" dirty="0"/>
+              <a:t>Alice’s web browser is about to send an HTTP request to a web server—specifically, to the URL </a:t>
+            </a:r>
+            <a:r>
+              <a:rPr lang="en-US" dirty="0">
+                <a:hlinkClick r:id="rId3"/>
+              </a:rPr>
+              <a:t>http://www.youtypeitwepostit.com/</a:t>
+            </a:r>
+            <a:r>
+              <a:rPr lang="en-US" dirty="0"/>
+              <a:t>. One web server may host many different URLs, and each URL grants access to a different bit of the data on the server.</a:t>
+            </a:r>
+          </a:p>
+          <a:p>
+            <a:pPr algn="just"/>
+            <a:endParaRPr lang="en-US" dirty="0"/>
+          </a:p>
+          <a:p>
+            <a:pPr algn="just"/>
+            <a:r>
+              <a:rPr lang="en-US" dirty="0"/>
+              <a:t>We say that a URL is the URL of some thing: a product, a user, the home page. The technical term for the thing named by a URL is </a:t>
+            </a:r>
+            <a:r>
+              <a:rPr lang="en-US" b="1" i="1" dirty="0"/>
+              <a:t>resource</a:t>
+            </a:r>
+            <a:r>
+              <a:rPr lang="en-US" dirty="0"/>
+              <a:t>.</a:t>
+            </a:r>
+          </a:p>
+          <a:p>
+            <a:pPr algn="just"/>
+            <a:endParaRPr lang="en-US" dirty="0"/>
+          </a:p>
+          <a:p>
+            <a:pPr algn="just"/>
+            <a:r>
+              <a:rPr lang="en-US" dirty="0"/>
+              <a:t>The URL </a:t>
+            </a:r>
+            <a:r>
+              <a:rPr lang="en-US" dirty="0">
+                <a:hlinkClick r:id="rId3"/>
+              </a:rPr>
+              <a:t>http://www.youtypeitwepostit.com/</a:t>
+            </a:r>
+            <a:r>
+              <a:rPr lang="en-US" dirty="0"/>
+              <a:t> identifies a resource—probably the home page of the website advertised on the billboard. But you won’t know for sure until we resume the story and Alice’s web browser sends the HTTP request.</a:t>
+            </a:r>
+          </a:p>
+          <a:p>
+            <a:endParaRPr lang="en-US" dirty="0"/>
+          </a:p>
+        </p:txBody>
+      </p:sp>
+      <p:sp>
+        <p:nvSpPr>
+          <p:cNvPr id="4" name="Slide Number Placeholder 3"/>
+          <p:cNvSpPr>
+            <a:spLocks noGrp="1"/>
+          </p:cNvSpPr>
+          <p:nvPr>
+            <p:ph type="sldNum" sz="quarter" idx="5"/>
+          </p:nvPr>
+        </p:nvSpPr>
+        <p:spPr/>
+        <p:txBody>
+          <a:bodyPr/>
+          <a:lstStyle/>
+          <a:p>
+            <a:fld id="{2E22A873-933D-4D09-931E-CDFDF5E37688}" type="slidenum">
+              <a:rPr lang="en-US" smtClean="0"/>
+              <a:t>48</a:t>
+            </a:fld>
+            <a:endParaRPr lang="en-US"/>
+          </a:p>
+        </p:txBody>
+      </p:sp>
+    </p:spTree>
+    <p:extLst>
+      <p:ext uri="{BB962C8B-B14F-4D97-AF65-F5344CB8AC3E}">
+        <p14:creationId xmlns:p14="http://schemas.microsoft.com/office/powerpoint/2010/main" val="694257739"/>
+      </p:ext>
+    </p:extLst>
+  </p:cSld>
+  <p:clrMapOvr>
+    <a:masterClrMapping/>
+  </p:clrMapOvr>
+</p:notes>
+</file>
+
+<file path=ppt/notesSlides/notesSlide49.xml><?xml version="1.0" encoding="utf-8"?>
+<p:notes xmlns:a="http://schemas.openxmlformats.org/drawingml/2006/main" xmlns:r="http://schemas.openxmlformats.org/officeDocument/2006/relationships" xmlns:p="http://schemas.openxmlformats.org/presentationml/2006/main">
+  <p:cSld>
+    <p:spTree>
+      <p:nvGrpSpPr>
+        <p:cNvPr id="1" name=""/>
+        <p:cNvGrpSpPr/>
+        <p:nvPr/>
+      </p:nvGrpSpPr>
+      <p:grpSpPr>
+        <a:xfrm>
+          <a:off x="0" y="0"/>
+          <a:ext cx="0" cy="0"/>
+          <a:chOff x="0" y="0"/>
+          <a:chExt cx="0" cy="0"/>
+        </a:xfrm>
+      </p:grpSpPr>
+      <p:sp>
+        <p:nvSpPr>
+          <p:cNvPr id="2" name="Slide Image Placeholder 1"/>
+          <p:cNvSpPr>
+            <a:spLocks noGrp="1" noRot="1" noChangeAspect="1"/>
+          </p:cNvSpPr>
+          <p:nvPr>
+            <p:ph type="sldImg"/>
+          </p:nvPr>
+        </p:nvSpPr>
+        <p:spPr/>
+      </p:sp>
+      <p:sp>
+        <p:nvSpPr>
+          <p:cNvPr id="3" name="Notes Placeholder 2"/>
+          <p:cNvSpPr>
+            <a:spLocks noGrp="1"/>
+          </p:cNvSpPr>
+          <p:nvPr>
+            <p:ph type="body" idx="1"/>
+          </p:nvPr>
+        </p:nvSpPr>
+        <p:spPr/>
+        <p:txBody>
+          <a:bodyPr/>
+          <a:lstStyle/>
+          <a:p>
+            <a:pPr algn="just"/>
+            <a:r>
+              <a:rPr lang="en-US" dirty="0"/>
+              <a:t>Sorry for interrupting the story, but I need to introduce some basic terminology.</a:t>
+            </a:r>
+          </a:p>
+          <a:p>
+            <a:pPr algn="just"/>
+            <a:endParaRPr lang="en-US" dirty="0"/>
+          </a:p>
+          <a:p>
+            <a:pPr algn="just"/>
+            <a:r>
+              <a:rPr lang="en-US" dirty="0"/>
+              <a:t>Alice’s web browser is about to send an HTTP request to a web server—specifically, to the URL </a:t>
+            </a:r>
+            <a:r>
+              <a:rPr lang="en-US" dirty="0">
+                <a:hlinkClick r:id="rId3"/>
+              </a:rPr>
+              <a:t>http://www.youtypeitwepostit.com/</a:t>
+            </a:r>
+            <a:r>
+              <a:rPr lang="en-US" dirty="0"/>
+              <a:t>. One web server may host many different URLs, and each URL grants access to a different bit of the data on the server.</a:t>
+            </a:r>
+          </a:p>
+          <a:p>
+            <a:pPr algn="just"/>
+            <a:endParaRPr lang="en-US" dirty="0"/>
+          </a:p>
+          <a:p>
+            <a:pPr algn="just"/>
+            <a:r>
+              <a:rPr lang="en-US" dirty="0"/>
+              <a:t>We say that a URL is the URL of some thing: a product, a user, the home page. The technical term for the thing named by a URL is </a:t>
+            </a:r>
+            <a:r>
+              <a:rPr lang="en-US" b="1" i="1" dirty="0"/>
+              <a:t>resource</a:t>
+            </a:r>
+            <a:r>
+              <a:rPr lang="en-US" dirty="0"/>
+              <a:t>.</a:t>
+            </a:r>
+          </a:p>
+          <a:p>
+            <a:pPr algn="just"/>
+            <a:endParaRPr lang="en-US" dirty="0"/>
+          </a:p>
+          <a:p>
+            <a:pPr algn="just"/>
+            <a:r>
+              <a:rPr lang="en-US" dirty="0"/>
+              <a:t>The URL </a:t>
+            </a:r>
+            <a:r>
+              <a:rPr lang="en-US" dirty="0">
+                <a:hlinkClick r:id="rId3"/>
+              </a:rPr>
+              <a:t>http://www.youtypeitwepostit.com/</a:t>
+            </a:r>
+            <a:r>
+              <a:rPr lang="en-US" dirty="0"/>
+              <a:t> identifies a resource—probably the home page of the website advertised on the billboard. But you won’t know for sure until we resume the story and Alice’s web browser sends the HTTP request.</a:t>
+            </a:r>
+          </a:p>
+          <a:p>
+            <a:endParaRPr lang="en-US" dirty="0"/>
+          </a:p>
+        </p:txBody>
+      </p:sp>
+      <p:sp>
+        <p:nvSpPr>
+          <p:cNvPr id="4" name="Slide Number Placeholder 3"/>
+          <p:cNvSpPr>
+            <a:spLocks noGrp="1"/>
+          </p:cNvSpPr>
+          <p:nvPr>
+            <p:ph type="sldNum" sz="quarter" idx="5"/>
+          </p:nvPr>
+        </p:nvSpPr>
+        <p:spPr/>
+        <p:txBody>
+          <a:bodyPr/>
+          <a:lstStyle/>
+          <a:p>
+            <a:fld id="{2E22A873-933D-4D09-931E-CDFDF5E37688}" type="slidenum">
+              <a:rPr lang="en-US" smtClean="0"/>
+              <a:t>49</a:t>
+            </a:fld>
+            <a:endParaRPr lang="en-US"/>
+          </a:p>
+        </p:txBody>
+      </p:sp>
+    </p:spTree>
+    <p:extLst>
+      <p:ext uri="{BB962C8B-B14F-4D97-AF65-F5344CB8AC3E}">
+        <p14:creationId xmlns:p14="http://schemas.microsoft.com/office/powerpoint/2010/main" val="2294622411"/>
       </p:ext>
     </p:extLst>
   </p:cSld>
@@ -7042,6 +7353,766 @@
     <p:extLst>
       <p:ext uri="{BB962C8B-B14F-4D97-AF65-F5344CB8AC3E}">
         <p14:creationId xmlns:p14="http://schemas.microsoft.com/office/powerpoint/2010/main" val="4171964553"/>
+      </p:ext>
+    </p:extLst>
+  </p:cSld>
+  <p:clrMapOvr>
+    <a:masterClrMapping/>
+  </p:clrMapOvr>
+</p:notes>
+</file>
+
+<file path=ppt/notesSlides/notesSlide50.xml><?xml version="1.0" encoding="utf-8"?>
+<p:notes xmlns:a="http://schemas.openxmlformats.org/drawingml/2006/main" xmlns:r="http://schemas.openxmlformats.org/officeDocument/2006/relationships" xmlns:p="http://schemas.openxmlformats.org/presentationml/2006/main">
+  <p:cSld>
+    <p:spTree>
+      <p:nvGrpSpPr>
+        <p:cNvPr id="1" name=""/>
+        <p:cNvGrpSpPr/>
+        <p:nvPr/>
+      </p:nvGrpSpPr>
+      <p:grpSpPr>
+        <a:xfrm>
+          <a:off x="0" y="0"/>
+          <a:ext cx="0" cy="0"/>
+          <a:chOff x="0" y="0"/>
+          <a:chExt cx="0" cy="0"/>
+        </a:xfrm>
+      </p:grpSpPr>
+      <p:sp>
+        <p:nvSpPr>
+          <p:cNvPr id="2" name="Slide Image Placeholder 1"/>
+          <p:cNvSpPr>
+            <a:spLocks noGrp="1" noRot="1" noChangeAspect="1"/>
+          </p:cNvSpPr>
+          <p:nvPr>
+            <p:ph type="sldImg"/>
+          </p:nvPr>
+        </p:nvSpPr>
+        <p:spPr/>
+      </p:sp>
+      <p:sp>
+        <p:nvSpPr>
+          <p:cNvPr id="3" name="Notes Placeholder 2"/>
+          <p:cNvSpPr>
+            <a:spLocks noGrp="1"/>
+          </p:cNvSpPr>
+          <p:nvPr>
+            <p:ph type="body" idx="1"/>
+          </p:nvPr>
+        </p:nvSpPr>
+        <p:spPr/>
+        <p:txBody>
+          <a:bodyPr/>
+          <a:lstStyle/>
+          <a:p>
+            <a:pPr algn="just"/>
+            <a:r>
+              <a:rPr lang="en-US" dirty="0"/>
+              <a:t>Sorry for interrupting the story, but I need to introduce some basic terminology.</a:t>
+            </a:r>
+          </a:p>
+          <a:p>
+            <a:pPr algn="just"/>
+            <a:endParaRPr lang="en-US" dirty="0"/>
+          </a:p>
+          <a:p>
+            <a:pPr algn="just"/>
+            <a:r>
+              <a:rPr lang="en-US" dirty="0"/>
+              <a:t>Alice’s web browser is about to send an HTTP request to a web server—specifically, to the URL </a:t>
+            </a:r>
+            <a:r>
+              <a:rPr lang="en-US" dirty="0">
+                <a:hlinkClick r:id="rId3"/>
+              </a:rPr>
+              <a:t>http://www.youtypeitwepostit.com/</a:t>
+            </a:r>
+            <a:r>
+              <a:rPr lang="en-US" dirty="0"/>
+              <a:t>. One web server may host many different URLs, and each URL grants access to a different bit of the data on the server.</a:t>
+            </a:r>
+          </a:p>
+          <a:p>
+            <a:pPr algn="just"/>
+            <a:endParaRPr lang="en-US" dirty="0"/>
+          </a:p>
+          <a:p>
+            <a:pPr algn="just"/>
+            <a:r>
+              <a:rPr lang="en-US" dirty="0"/>
+              <a:t>We say that a URL is the URL of some thing: a product, a user, the home page. The technical term for the thing named by a URL is </a:t>
+            </a:r>
+            <a:r>
+              <a:rPr lang="en-US" b="1" i="1" dirty="0"/>
+              <a:t>resource</a:t>
+            </a:r>
+            <a:r>
+              <a:rPr lang="en-US" dirty="0"/>
+              <a:t>.</a:t>
+            </a:r>
+          </a:p>
+          <a:p>
+            <a:pPr algn="just"/>
+            <a:endParaRPr lang="en-US" dirty="0"/>
+          </a:p>
+          <a:p>
+            <a:pPr algn="just"/>
+            <a:r>
+              <a:rPr lang="en-US" dirty="0"/>
+              <a:t>The URL </a:t>
+            </a:r>
+            <a:r>
+              <a:rPr lang="en-US" dirty="0">
+                <a:hlinkClick r:id="rId3"/>
+              </a:rPr>
+              <a:t>http://www.youtypeitwepostit.com/</a:t>
+            </a:r>
+            <a:r>
+              <a:rPr lang="en-US" dirty="0"/>
+              <a:t> identifies a resource—probably the home page of the website advertised on the billboard. But you won’t know for sure until we resume the story and Alice’s web browser sends the HTTP request.</a:t>
+            </a:r>
+          </a:p>
+          <a:p>
+            <a:endParaRPr lang="en-US" dirty="0"/>
+          </a:p>
+        </p:txBody>
+      </p:sp>
+      <p:sp>
+        <p:nvSpPr>
+          <p:cNvPr id="4" name="Slide Number Placeholder 3"/>
+          <p:cNvSpPr>
+            <a:spLocks noGrp="1"/>
+          </p:cNvSpPr>
+          <p:nvPr>
+            <p:ph type="sldNum" sz="quarter" idx="5"/>
+          </p:nvPr>
+        </p:nvSpPr>
+        <p:spPr/>
+        <p:txBody>
+          <a:bodyPr/>
+          <a:lstStyle/>
+          <a:p>
+            <a:fld id="{2E22A873-933D-4D09-931E-CDFDF5E37688}" type="slidenum">
+              <a:rPr lang="en-US" smtClean="0"/>
+              <a:t>50</a:t>
+            </a:fld>
+            <a:endParaRPr lang="en-US"/>
+          </a:p>
+        </p:txBody>
+      </p:sp>
+    </p:spTree>
+    <p:extLst>
+      <p:ext uri="{BB962C8B-B14F-4D97-AF65-F5344CB8AC3E}">
+        <p14:creationId xmlns:p14="http://schemas.microsoft.com/office/powerpoint/2010/main" val="2559554720"/>
+      </p:ext>
+    </p:extLst>
+  </p:cSld>
+  <p:clrMapOvr>
+    <a:masterClrMapping/>
+  </p:clrMapOvr>
+</p:notes>
+</file>
+
+<file path=ppt/notesSlides/notesSlide51.xml><?xml version="1.0" encoding="utf-8"?>
+<p:notes xmlns:a="http://schemas.openxmlformats.org/drawingml/2006/main" xmlns:r="http://schemas.openxmlformats.org/officeDocument/2006/relationships" xmlns:p="http://schemas.openxmlformats.org/presentationml/2006/main">
+  <p:cSld>
+    <p:spTree>
+      <p:nvGrpSpPr>
+        <p:cNvPr id="1" name=""/>
+        <p:cNvGrpSpPr/>
+        <p:nvPr/>
+      </p:nvGrpSpPr>
+      <p:grpSpPr>
+        <a:xfrm>
+          <a:off x="0" y="0"/>
+          <a:ext cx="0" cy="0"/>
+          <a:chOff x="0" y="0"/>
+          <a:chExt cx="0" cy="0"/>
+        </a:xfrm>
+      </p:grpSpPr>
+      <p:sp>
+        <p:nvSpPr>
+          <p:cNvPr id="2" name="Slide Image Placeholder 1"/>
+          <p:cNvSpPr>
+            <a:spLocks noGrp="1" noRot="1" noChangeAspect="1"/>
+          </p:cNvSpPr>
+          <p:nvPr>
+            <p:ph type="sldImg"/>
+          </p:nvPr>
+        </p:nvSpPr>
+        <p:spPr/>
+      </p:sp>
+      <p:sp>
+        <p:nvSpPr>
+          <p:cNvPr id="3" name="Notes Placeholder 2"/>
+          <p:cNvSpPr>
+            <a:spLocks noGrp="1"/>
+          </p:cNvSpPr>
+          <p:nvPr>
+            <p:ph type="body" idx="1"/>
+          </p:nvPr>
+        </p:nvSpPr>
+        <p:spPr/>
+        <p:txBody>
+          <a:bodyPr/>
+          <a:lstStyle/>
+          <a:p>
+            <a:pPr algn="just"/>
+            <a:r>
+              <a:rPr lang="en-US" dirty="0"/>
+              <a:t>Sorry for interrupting the story, but I need to introduce some basic terminology.</a:t>
+            </a:r>
+          </a:p>
+          <a:p>
+            <a:pPr algn="just"/>
+            <a:endParaRPr lang="en-US" dirty="0"/>
+          </a:p>
+          <a:p>
+            <a:pPr algn="just"/>
+            <a:r>
+              <a:rPr lang="en-US" dirty="0"/>
+              <a:t>Alice’s web browser is about to send an HTTP request to a web server—specifically, to the URL </a:t>
+            </a:r>
+            <a:r>
+              <a:rPr lang="en-US" dirty="0">
+                <a:hlinkClick r:id="rId3"/>
+              </a:rPr>
+              <a:t>http://www.youtypeitwepostit.com/</a:t>
+            </a:r>
+            <a:r>
+              <a:rPr lang="en-US" dirty="0"/>
+              <a:t>. One web server may host many different URLs, and each URL grants access to a different bit of the data on the server.</a:t>
+            </a:r>
+          </a:p>
+          <a:p>
+            <a:pPr algn="just"/>
+            <a:endParaRPr lang="en-US" dirty="0"/>
+          </a:p>
+          <a:p>
+            <a:pPr algn="just"/>
+            <a:r>
+              <a:rPr lang="en-US" dirty="0"/>
+              <a:t>We say that a URL is the URL of some thing: a product, a user, the home page. The technical term for the thing named by a URL is </a:t>
+            </a:r>
+            <a:r>
+              <a:rPr lang="en-US" b="1" i="1" dirty="0"/>
+              <a:t>resource</a:t>
+            </a:r>
+            <a:r>
+              <a:rPr lang="en-US" dirty="0"/>
+              <a:t>.</a:t>
+            </a:r>
+          </a:p>
+          <a:p>
+            <a:pPr algn="just"/>
+            <a:endParaRPr lang="en-US" dirty="0"/>
+          </a:p>
+          <a:p>
+            <a:pPr algn="just"/>
+            <a:r>
+              <a:rPr lang="en-US" dirty="0"/>
+              <a:t>The URL </a:t>
+            </a:r>
+            <a:r>
+              <a:rPr lang="en-US" dirty="0">
+                <a:hlinkClick r:id="rId3"/>
+              </a:rPr>
+              <a:t>http://www.youtypeitwepostit.com/</a:t>
+            </a:r>
+            <a:r>
+              <a:rPr lang="en-US" dirty="0"/>
+              <a:t> identifies a resource—probably the home page of the website advertised on the billboard. But you won’t know for sure until we resume the story and Alice’s web browser sends the HTTP request.</a:t>
+            </a:r>
+          </a:p>
+          <a:p>
+            <a:endParaRPr lang="en-US" dirty="0"/>
+          </a:p>
+        </p:txBody>
+      </p:sp>
+      <p:sp>
+        <p:nvSpPr>
+          <p:cNvPr id="4" name="Slide Number Placeholder 3"/>
+          <p:cNvSpPr>
+            <a:spLocks noGrp="1"/>
+          </p:cNvSpPr>
+          <p:nvPr>
+            <p:ph type="sldNum" sz="quarter" idx="5"/>
+          </p:nvPr>
+        </p:nvSpPr>
+        <p:spPr/>
+        <p:txBody>
+          <a:bodyPr/>
+          <a:lstStyle/>
+          <a:p>
+            <a:fld id="{2E22A873-933D-4D09-931E-CDFDF5E37688}" type="slidenum">
+              <a:rPr lang="en-US" smtClean="0"/>
+              <a:t>51</a:t>
+            </a:fld>
+            <a:endParaRPr lang="en-US"/>
+          </a:p>
+        </p:txBody>
+      </p:sp>
+    </p:spTree>
+    <p:extLst>
+      <p:ext uri="{BB962C8B-B14F-4D97-AF65-F5344CB8AC3E}">
+        <p14:creationId xmlns:p14="http://schemas.microsoft.com/office/powerpoint/2010/main" val="3985584034"/>
+      </p:ext>
+    </p:extLst>
+  </p:cSld>
+  <p:clrMapOvr>
+    <a:masterClrMapping/>
+  </p:clrMapOvr>
+</p:notes>
+</file>
+
+<file path=ppt/notesSlides/notesSlide52.xml><?xml version="1.0" encoding="utf-8"?>
+<p:notes xmlns:a="http://schemas.openxmlformats.org/drawingml/2006/main" xmlns:r="http://schemas.openxmlformats.org/officeDocument/2006/relationships" xmlns:p="http://schemas.openxmlformats.org/presentationml/2006/main">
+  <p:cSld>
+    <p:spTree>
+      <p:nvGrpSpPr>
+        <p:cNvPr id="1" name=""/>
+        <p:cNvGrpSpPr/>
+        <p:nvPr/>
+      </p:nvGrpSpPr>
+      <p:grpSpPr>
+        <a:xfrm>
+          <a:off x="0" y="0"/>
+          <a:ext cx="0" cy="0"/>
+          <a:chOff x="0" y="0"/>
+          <a:chExt cx="0" cy="0"/>
+        </a:xfrm>
+      </p:grpSpPr>
+      <p:sp>
+        <p:nvSpPr>
+          <p:cNvPr id="2" name="Slide Image Placeholder 1"/>
+          <p:cNvSpPr>
+            <a:spLocks noGrp="1" noRot="1" noChangeAspect="1"/>
+          </p:cNvSpPr>
+          <p:nvPr>
+            <p:ph type="sldImg"/>
+          </p:nvPr>
+        </p:nvSpPr>
+        <p:spPr/>
+      </p:sp>
+      <p:sp>
+        <p:nvSpPr>
+          <p:cNvPr id="3" name="Notes Placeholder 2"/>
+          <p:cNvSpPr>
+            <a:spLocks noGrp="1"/>
+          </p:cNvSpPr>
+          <p:nvPr>
+            <p:ph type="body" idx="1"/>
+          </p:nvPr>
+        </p:nvSpPr>
+        <p:spPr/>
+        <p:txBody>
+          <a:bodyPr/>
+          <a:lstStyle/>
+          <a:p>
+            <a:pPr algn="just"/>
+            <a:r>
+              <a:rPr lang="en-US" dirty="0"/>
+              <a:t>Sorry for interrupting the story, but I need to introduce some basic terminology.</a:t>
+            </a:r>
+          </a:p>
+          <a:p>
+            <a:pPr algn="just"/>
+            <a:endParaRPr lang="en-US" dirty="0"/>
+          </a:p>
+          <a:p>
+            <a:pPr algn="just"/>
+            <a:r>
+              <a:rPr lang="en-US" dirty="0"/>
+              <a:t>Alice’s web browser is about to send an HTTP request to a web server—specifically, to the URL </a:t>
+            </a:r>
+            <a:r>
+              <a:rPr lang="en-US" dirty="0">
+                <a:hlinkClick r:id="rId3"/>
+              </a:rPr>
+              <a:t>http://www.youtypeitwepostit.com/</a:t>
+            </a:r>
+            <a:r>
+              <a:rPr lang="en-US" dirty="0"/>
+              <a:t>. One web server may host many different URLs, and each URL grants access to a different bit of the data on the server.</a:t>
+            </a:r>
+          </a:p>
+          <a:p>
+            <a:pPr algn="just"/>
+            <a:endParaRPr lang="en-US" dirty="0"/>
+          </a:p>
+          <a:p>
+            <a:pPr algn="just"/>
+            <a:r>
+              <a:rPr lang="en-US" dirty="0"/>
+              <a:t>We say that a URL is the URL of some thing: a product, a user, the home page. The technical term for the thing named by a URL is </a:t>
+            </a:r>
+            <a:r>
+              <a:rPr lang="en-US" b="1" i="1" dirty="0"/>
+              <a:t>resource</a:t>
+            </a:r>
+            <a:r>
+              <a:rPr lang="en-US" dirty="0"/>
+              <a:t>.</a:t>
+            </a:r>
+          </a:p>
+          <a:p>
+            <a:pPr algn="just"/>
+            <a:endParaRPr lang="en-US" dirty="0"/>
+          </a:p>
+          <a:p>
+            <a:pPr algn="just"/>
+            <a:r>
+              <a:rPr lang="en-US" dirty="0"/>
+              <a:t>The URL </a:t>
+            </a:r>
+            <a:r>
+              <a:rPr lang="en-US" dirty="0">
+                <a:hlinkClick r:id="rId3"/>
+              </a:rPr>
+              <a:t>http://www.youtypeitwepostit.com/</a:t>
+            </a:r>
+            <a:r>
+              <a:rPr lang="en-US" dirty="0"/>
+              <a:t> identifies a resource—probably the home page of the website advertised on the billboard. But you won’t know for sure until we resume the story and Alice’s web browser sends the HTTP request.</a:t>
+            </a:r>
+          </a:p>
+          <a:p>
+            <a:endParaRPr lang="en-US" dirty="0"/>
+          </a:p>
+        </p:txBody>
+      </p:sp>
+      <p:sp>
+        <p:nvSpPr>
+          <p:cNvPr id="4" name="Slide Number Placeholder 3"/>
+          <p:cNvSpPr>
+            <a:spLocks noGrp="1"/>
+          </p:cNvSpPr>
+          <p:nvPr>
+            <p:ph type="sldNum" sz="quarter" idx="5"/>
+          </p:nvPr>
+        </p:nvSpPr>
+        <p:spPr/>
+        <p:txBody>
+          <a:bodyPr/>
+          <a:lstStyle/>
+          <a:p>
+            <a:fld id="{2E22A873-933D-4D09-931E-CDFDF5E37688}" type="slidenum">
+              <a:rPr lang="en-US" smtClean="0"/>
+              <a:t>52</a:t>
+            </a:fld>
+            <a:endParaRPr lang="en-US"/>
+          </a:p>
+        </p:txBody>
+      </p:sp>
+    </p:spTree>
+    <p:extLst>
+      <p:ext uri="{BB962C8B-B14F-4D97-AF65-F5344CB8AC3E}">
+        <p14:creationId xmlns:p14="http://schemas.microsoft.com/office/powerpoint/2010/main" val="520695387"/>
+      </p:ext>
+    </p:extLst>
+  </p:cSld>
+  <p:clrMapOvr>
+    <a:masterClrMapping/>
+  </p:clrMapOvr>
+</p:notes>
+</file>
+
+<file path=ppt/notesSlides/notesSlide53.xml><?xml version="1.0" encoding="utf-8"?>
+<p:notes xmlns:a="http://schemas.openxmlformats.org/drawingml/2006/main" xmlns:r="http://schemas.openxmlformats.org/officeDocument/2006/relationships" xmlns:p="http://schemas.openxmlformats.org/presentationml/2006/main">
+  <p:cSld>
+    <p:spTree>
+      <p:nvGrpSpPr>
+        <p:cNvPr id="1" name=""/>
+        <p:cNvGrpSpPr/>
+        <p:nvPr/>
+      </p:nvGrpSpPr>
+      <p:grpSpPr>
+        <a:xfrm>
+          <a:off x="0" y="0"/>
+          <a:ext cx="0" cy="0"/>
+          <a:chOff x="0" y="0"/>
+          <a:chExt cx="0" cy="0"/>
+        </a:xfrm>
+      </p:grpSpPr>
+      <p:sp>
+        <p:nvSpPr>
+          <p:cNvPr id="2" name="Slide Image Placeholder 1"/>
+          <p:cNvSpPr>
+            <a:spLocks noGrp="1" noRot="1" noChangeAspect="1"/>
+          </p:cNvSpPr>
+          <p:nvPr>
+            <p:ph type="sldImg"/>
+          </p:nvPr>
+        </p:nvSpPr>
+        <p:spPr/>
+      </p:sp>
+      <p:sp>
+        <p:nvSpPr>
+          <p:cNvPr id="3" name="Notes Placeholder 2"/>
+          <p:cNvSpPr>
+            <a:spLocks noGrp="1"/>
+          </p:cNvSpPr>
+          <p:nvPr>
+            <p:ph type="body" idx="1"/>
+          </p:nvPr>
+        </p:nvSpPr>
+        <p:spPr/>
+        <p:txBody>
+          <a:bodyPr/>
+          <a:lstStyle/>
+          <a:p>
+            <a:pPr algn="just"/>
+            <a:r>
+              <a:rPr lang="en-US" dirty="0"/>
+              <a:t>Sorry for interrupting the story, but I need to introduce some basic terminology.</a:t>
+            </a:r>
+          </a:p>
+          <a:p>
+            <a:pPr algn="just"/>
+            <a:endParaRPr lang="en-US" dirty="0"/>
+          </a:p>
+          <a:p>
+            <a:pPr algn="just"/>
+            <a:r>
+              <a:rPr lang="en-US" dirty="0"/>
+              <a:t>Alice’s web browser is about to send an HTTP request to a web server—specifically, to the URL </a:t>
+            </a:r>
+            <a:r>
+              <a:rPr lang="en-US" dirty="0">
+                <a:hlinkClick r:id="rId3"/>
+              </a:rPr>
+              <a:t>http://www.youtypeitwepostit.com/</a:t>
+            </a:r>
+            <a:r>
+              <a:rPr lang="en-US" dirty="0"/>
+              <a:t>. One web server may host many different URLs, and each URL grants access to a different bit of the data on the server.</a:t>
+            </a:r>
+          </a:p>
+          <a:p>
+            <a:pPr algn="just"/>
+            <a:endParaRPr lang="en-US" dirty="0"/>
+          </a:p>
+          <a:p>
+            <a:pPr algn="just"/>
+            <a:r>
+              <a:rPr lang="en-US" dirty="0"/>
+              <a:t>We say that a URL is the URL of some thing: a product, a user, the home page. The technical term for the thing named by a URL is </a:t>
+            </a:r>
+            <a:r>
+              <a:rPr lang="en-US" b="1" i="1" dirty="0"/>
+              <a:t>resource</a:t>
+            </a:r>
+            <a:r>
+              <a:rPr lang="en-US" dirty="0"/>
+              <a:t>.</a:t>
+            </a:r>
+          </a:p>
+          <a:p>
+            <a:pPr algn="just"/>
+            <a:endParaRPr lang="en-US" dirty="0"/>
+          </a:p>
+          <a:p>
+            <a:pPr algn="just"/>
+            <a:r>
+              <a:rPr lang="en-US" dirty="0"/>
+              <a:t>The URL </a:t>
+            </a:r>
+            <a:r>
+              <a:rPr lang="en-US" dirty="0">
+                <a:hlinkClick r:id="rId3"/>
+              </a:rPr>
+              <a:t>http://www.youtypeitwepostit.com/</a:t>
+            </a:r>
+            <a:r>
+              <a:rPr lang="en-US" dirty="0"/>
+              <a:t> identifies a resource—probably the home page of the website advertised on the billboard. But you won’t know for sure until we resume the story and Alice’s web browser sends the HTTP request.</a:t>
+            </a:r>
+          </a:p>
+          <a:p>
+            <a:endParaRPr lang="en-US" dirty="0"/>
+          </a:p>
+        </p:txBody>
+      </p:sp>
+      <p:sp>
+        <p:nvSpPr>
+          <p:cNvPr id="4" name="Slide Number Placeholder 3"/>
+          <p:cNvSpPr>
+            <a:spLocks noGrp="1"/>
+          </p:cNvSpPr>
+          <p:nvPr>
+            <p:ph type="sldNum" sz="quarter" idx="5"/>
+          </p:nvPr>
+        </p:nvSpPr>
+        <p:spPr/>
+        <p:txBody>
+          <a:bodyPr/>
+          <a:lstStyle/>
+          <a:p>
+            <a:fld id="{2E22A873-933D-4D09-931E-CDFDF5E37688}" type="slidenum">
+              <a:rPr lang="en-US" smtClean="0"/>
+              <a:t>53</a:t>
+            </a:fld>
+            <a:endParaRPr lang="en-US"/>
+          </a:p>
+        </p:txBody>
+      </p:sp>
+    </p:spTree>
+    <p:extLst>
+      <p:ext uri="{BB962C8B-B14F-4D97-AF65-F5344CB8AC3E}">
+        <p14:creationId xmlns:p14="http://schemas.microsoft.com/office/powerpoint/2010/main" val="2132345273"/>
+      </p:ext>
+    </p:extLst>
+  </p:cSld>
+  <p:clrMapOvr>
+    <a:masterClrMapping/>
+  </p:clrMapOvr>
+</p:notes>
+</file>
+
+<file path=ppt/notesSlides/notesSlide54.xml><?xml version="1.0" encoding="utf-8"?>
+<p:notes xmlns:a="http://schemas.openxmlformats.org/drawingml/2006/main" xmlns:r="http://schemas.openxmlformats.org/officeDocument/2006/relationships" xmlns:p="http://schemas.openxmlformats.org/presentationml/2006/main">
+  <p:cSld>
+    <p:spTree>
+      <p:nvGrpSpPr>
+        <p:cNvPr id="1" name=""/>
+        <p:cNvGrpSpPr/>
+        <p:nvPr/>
+      </p:nvGrpSpPr>
+      <p:grpSpPr>
+        <a:xfrm>
+          <a:off x="0" y="0"/>
+          <a:ext cx="0" cy="0"/>
+          <a:chOff x="0" y="0"/>
+          <a:chExt cx="0" cy="0"/>
+        </a:xfrm>
+      </p:grpSpPr>
+      <p:sp>
+        <p:nvSpPr>
+          <p:cNvPr id="2" name="Slide Image Placeholder 1"/>
+          <p:cNvSpPr>
+            <a:spLocks noGrp="1" noRot="1" noChangeAspect="1"/>
+          </p:cNvSpPr>
+          <p:nvPr>
+            <p:ph type="sldImg"/>
+          </p:nvPr>
+        </p:nvSpPr>
+        <p:spPr/>
+      </p:sp>
+      <p:sp>
+        <p:nvSpPr>
+          <p:cNvPr id="3" name="Notes Placeholder 2"/>
+          <p:cNvSpPr>
+            <a:spLocks noGrp="1"/>
+          </p:cNvSpPr>
+          <p:nvPr>
+            <p:ph type="body" idx="1"/>
+          </p:nvPr>
+        </p:nvSpPr>
+        <p:spPr/>
+        <p:txBody>
+          <a:bodyPr/>
+          <a:lstStyle/>
+          <a:p>
+            <a:pPr algn="just"/>
+            <a:r>
+              <a:rPr lang="en-US" dirty="0"/>
+              <a:t>Sorry for interrupting the story, but I need to introduce some basic terminology.</a:t>
+            </a:r>
+          </a:p>
+          <a:p>
+            <a:pPr algn="just"/>
+            <a:endParaRPr lang="en-US" dirty="0"/>
+          </a:p>
+          <a:p>
+            <a:pPr algn="just"/>
+            <a:r>
+              <a:rPr lang="en-US" dirty="0"/>
+              <a:t>Alice’s web browser is about to send an HTTP request to a web server—specifically, to the URL </a:t>
+            </a:r>
+            <a:r>
+              <a:rPr lang="en-US" dirty="0">
+                <a:hlinkClick r:id="rId3"/>
+              </a:rPr>
+              <a:t>http://www.youtypeitwepostit.com/</a:t>
+            </a:r>
+            <a:r>
+              <a:rPr lang="en-US" dirty="0"/>
+              <a:t>. One web server may host many different URLs, and each URL grants access to a different bit of the data on the server.</a:t>
+            </a:r>
+          </a:p>
+          <a:p>
+            <a:pPr algn="just"/>
+            <a:endParaRPr lang="en-US" dirty="0"/>
+          </a:p>
+          <a:p>
+            <a:pPr algn="just"/>
+            <a:r>
+              <a:rPr lang="en-US" dirty="0"/>
+              <a:t>We say that a URL is the URL of some thing: a product, a user, the home page. The technical term for the thing named by a URL is </a:t>
+            </a:r>
+            <a:r>
+              <a:rPr lang="en-US" b="1" i="1" dirty="0"/>
+              <a:t>resource</a:t>
+            </a:r>
+            <a:r>
+              <a:rPr lang="en-US" dirty="0"/>
+              <a:t>.</a:t>
+            </a:r>
+          </a:p>
+          <a:p>
+            <a:pPr algn="just"/>
+            <a:endParaRPr lang="en-US" dirty="0"/>
+          </a:p>
+          <a:p>
+            <a:pPr algn="just"/>
+            <a:r>
+              <a:rPr lang="en-US" dirty="0"/>
+              <a:t>The URL </a:t>
+            </a:r>
+            <a:r>
+              <a:rPr lang="en-US" dirty="0">
+                <a:hlinkClick r:id="rId3"/>
+              </a:rPr>
+              <a:t>http://www.youtypeitwepostit.com/</a:t>
+            </a:r>
+            <a:r>
+              <a:rPr lang="en-US" dirty="0"/>
+              <a:t> identifies a resource—probably the home page of the website advertised on the billboard. But you won’t know for sure until we resume the story and Alice’s web browser sends the HTTP request.</a:t>
+            </a:r>
+          </a:p>
+          <a:p>
+            <a:endParaRPr lang="en-US" dirty="0"/>
+          </a:p>
+        </p:txBody>
+      </p:sp>
+      <p:sp>
+        <p:nvSpPr>
+          <p:cNvPr id="4" name="Slide Number Placeholder 3"/>
+          <p:cNvSpPr>
+            <a:spLocks noGrp="1"/>
+          </p:cNvSpPr>
+          <p:nvPr>
+            <p:ph type="sldNum" sz="quarter" idx="5"/>
+          </p:nvPr>
+        </p:nvSpPr>
+        <p:spPr/>
+        <p:txBody>
+          <a:bodyPr/>
+          <a:lstStyle/>
+          <a:p>
+            <a:fld id="{2E22A873-933D-4D09-931E-CDFDF5E37688}" type="slidenum">
+              <a:rPr lang="en-US" smtClean="0"/>
+              <a:t>54</a:t>
+            </a:fld>
+            <a:endParaRPr lang="en-US"/>
+          </a:p>
+        </p:txBody>
+      </p:sp>
+    </p:spTree>
+    <p:extLst>
+      <p:ext uri="{BB962C8B-B14F-4D97-AF65-F5344CB8AC3E}">
+        <p14:creationId xmlns:p14="http://schemas.microsoft.com/office/powerpoint/2010/main" val="3980331847"/>
       </p:ext>
     </p:extLst>
   </p:cSld>
@@ -30306,6 +31377,2590 @@
                 <a:latin typeface="Segoe UI" panose="020B0502040204020203" pitchFamily="34" charset="0"/>
                 <a:cs typeface="Segoe UI" panose="020B0502040204020203" pitchFamily="34" charset="0"/>
               </a:rPr>
+              <a:t>Functions are Objects</a:t>
+            </a:r>
+            <a:endParaRPr lang="en-US" b="1" dirty="0">
+              <a:solidFill>
+                <a:schemeClr val="tx1">
+                  <a:lumMod val="85000"/>
+                  <a:lumOff val="15000"/>
+                </a:schemeClr>
+              </a:solidFill>
+              <a:latin typeface="Segoe UI" panose="020B0502040204020203" pitchFamily="34" charset="0"/>
+              <a:cs typeface="Segoe UI" panose="020B0502040204020203" pitchFamily="34" charset="0"/>
+            </a:endParaRPr>
+          </a:p>
+        </p:txBody>
+      </p:sp>
+      <p:sp>
+        <p:nvSpPr>
+          <p:cNvPr id="6" name="TextBox 5">
+            <a:extLst>
+              <a:ext uri="{FF2B5EF4-FFF2-40B4-BE49-F238E27FC236}">
+                <a16:creationId xmlns:a16="http://schemas.microsoft.com/office/drawing/2014/main" id="{F308816D-562E-4F4D-9CFF-7FF02259B6DA}"/>
+              </a:ext>
+            </a:extLst>
+          </p:cNvPr>
+          <p:cNvSpPr txBox="1"/>
+          <p:nvPr/>
+        </p:nvSpPr>
+        <p:spPr>
+          <a:xfrm>
+            <a:off x="1507066" y="1643512"/>
+            <a:ext cx="9616652" cy="584775"/>
+          </a:xfrm>
+          <a:prstGeom prst="rect">
+            <a:avLst/>
+          </a:prstGeom>
+          <a:solidFill>
+            <a:schemeClr val="accent1">
+              <a:lumMod val="40000"/>
+              <a:lumOff val="60000"/>
+            </a:schemeClr>
+          </a:solidFill>
+          <a:ln w="57150">
+            <a:solidFill>
+              <a:srgbClr val="0070C0"/>
+            </a:solidFill>
+          </a:ln>
+        </p:spPr>
+        <p:txBody>
+          <a:bodyPr wrap="square">
+            <a:spAutoFit/>
+          </a:bodyPr>
+          <a:lstStyle/>
+          <a:p>
+            <a:pPr algn="just"/>
+            <a:r>
+              <a:rPr lang="en-US" sz="1600" dirty="0">
+                <a:latin typeface="Segoe UI" panose="020B0502040204020203" pitchFamily="34" charset="0"/>
+                <a:cs typeface="Segoe UI" panose="020B0502040204020203" pitchFamily="34" charset="0"/>
+              </a:rPr>
+              <a:t>We’ve seen that </a:t>
+            </a:r>
+            <a:r>
+              <a:rPr lang="en-US" sz="1600" b="1" dirty="0">
+                <a:latin typeface="Segoe UI" panose="020B0502040204020203" pitchFamily="34" charset="0"/>
+                <a:cs typeface="Segoe UI" panose="020B0502040204020203" pitchFamily="34" charset="0"/>
+              </a:rPr>
+              <a:t>functions are values </a:t>
+            </a:r>
+            <a:r>
+              <a:rPr lang="en-US" sz="1600" dirty="0">
+                <a:latin typeface="Segoe UI" panose="020B0502040204020203" pitchFamily="34" charset="0"/>
+                <a:cs typeface="Segoe UI" panose="020B0502040204020203" pitchFamily="34" charset="0"/>
+              </a:rPr>
+              <a:t>in JavaScript programs., but functions are </a:t>
+            </a:r>
+            <a:r>
+              <a:rPr lang="en-US" sz="1600" b="1" dirty="0">
+                <a:latin typeface="Segoe UI" panose="020B0502040204020203" pitchFamily="34" charset="0"/>
+                <a:cs typeface="Segoe UI" panose="020B0502040204020203" pitchFamily="34" charset="0"/>
+              </a:rPr>
+              <a:t>really a specialized kind of object</a:t>
+            </a:r>
+            <a:r>
+              <a:rPr lang="en-US" sz="1600" dirty="0">
+                <a:latin typeface="Segoe UI" panose="020B0502040204020203" pitchFamily="34" charset="0"/>
+                <a:cs typeface="Segoe UI" panose="020B0502040204020203" pitchFamily="34" charset="0"/>
+              </a:rPr>
+              <a:t>.</a:t>
+            </a:r>
+          </a:p>
+        </p:txBody>
+      </p:sp>
+      <p:sp>
+        <p:nvSpPr>
+          <p:cNvPr id="7" name="TextBox 6">
+            <a:extLst>
+              <a:ext uri="{FF2B5EF4-FFF2-40B4-BE49-F238E27FC236}">
+                <a16:creationId xmlns:a16="http://schemas.microsoft.com/office/drawing/2014/main" id="{5E2DCB2F-B157-4F5F-89AF-56D918302835}"/>
+              </a:ext>
+            </a:extLst>
+          </p:cNvPr>
+          <p:cNvSpPr txBox="1"/>
+          <p:nvPr/>
+        </p:nvSpPr>
+        <p:spPr>
+          <a:xfrm>
+            <a:off x="1507066" y="2556315"/>
+            <a:ext cx="9616652" cy="338554"/>
+          </a:xfrm>
+          <a:prstGeom prst="rect">
+            <a:avLst/>
+          </a:prstGeom>
+          <a:solidFill>
+            <a:schemeClr val="accent1">
+              <a:lumMod val="40000"/>
+              <a:lumOff val="60000"/>
+            </a:schemeClr>
+          </a:solidFill>
+          <a:ln w="57150">
+            <a:solidFill>
+              <a:srgbClr val="0070C0"/>
+            </a:solidFill>
+          </a:ln>
+        </p:spPr>
+        <p:txBody>
+          <a:bodyPr wrap="square">
+            <a:spAutoFit/>
+          </a:bodyPr>
+          <a:lstStyle/>
+          <a:p>
+            <a:pPr algn="just"/>
+            <a:r>
+              <a:rPr lang="en-US" sz="1600" dirty="0">
+                <a:latin typeface="Segoe UI" panose="020B0502040204020203" pitchFamily="34" charset="0"/>
+                <a:cs typeface="Segoe UI" panose="020B0502040204020203" pitchFamily="34" charset="0"/>
+              </a:rPr>
+              <a:t>Since functions are objects, they can have </a:t>
+            </a:r>
+            <a:r>
+              <a:rPr lang="en-US" sz="1600" b="1" dirty="0">
+                <a:latin typeface="Segoe UI" panose="020B0502040204020203" pitchFamily="34" charset="0"/>
+                <a:cs typeface="Segoe UI" panose="020B0502040204020203" pitchFamily="34" charset="0"/>
+              </a:rPr>
+              <a:t>properties</a:t>
+            </a:r>
+            <a:r>
+              <a:rPr lang="en-US" sz="1600" dirty="0">
+                <a:latin typeface="Segoe UI" panose="020B0502040204020203" pitchFamily="34" charset="0"/>
+                <a:cs typeface="Segoe UI" panose="020B0502040204020203" pitchFamily="34" charset="0"/>
+              </a:rPr>
+              <a:t> and </a:t>
+            </a:r>
+            <a:r>
+              <a:rPr lang="en-US" sz="1600" b="1" dirty="0">
+                <a:latin typeface="Segoe UI" panose="020B0502040204020203" pitchFamily="34" charset="0"/>
+                <a:cs typeface="Segoe UI" panose="020B0502040204020203" pitchFamily="34" charset="0"/>
+              </a:rPr>
+              <a:t>methods</a:t>
+            </a:r>
+            <a:r>
+              <a:rPr lang="en-US" sz="1600" dirty="0">
+                <a:latin typeface="Segoe UI" panose="020B0502040204020203" pitchFamily="34" charset="0"/>
+                <a:cs typeface="Segoe UI" panose="020B0502040204020203" pitchFamily="34" charset="0"/>
+              </a:rPr>
+              <a:t>, just like any other object.</a:t>
+            </a:r>
+          </a:p>
+        </p:txBody>
+      </p:sp>
+    </p:spTree>
+    <p:extLst>
+      <p:ext uri="{BB962C8B-B14F-4D97-AF65-F5344CB8AC3E}">
+        <p14:creationId xmlns:p14="http://schemas.microsoft.com/office/powerpoint/2010/main" val="3916503520"/>
+      </p:ext>
+    </p:extLst>
+  </p:cSld>
+  <p:clrMapOvr>
+    <a:masterClrMapping/>
+  </p:clrMapOvr>
+</p:sld>
+</file>
+
+<file path=ppt/slides/slide48.xml><?xml version="1.0" encoding="utf-8"?>
+<p:sld xmlns:a="http://schemas.openxmlformats.org/drawingml/2006/main" xmlns:r="http://schemas.openxmlformats.org/officeDocument/2006/relationships" xmlns:p="http://schemas.openxmlformats.org/presentationml/2006/main">
+  <p:cSld>
+    <p:spTree>
+      <p:nvGrpSpPr>
+        <p:cNvPr id="1" name=""/>
+        <p:cNvGrpSpPr/>
+        <p:nvPr/>
+      </p:nvGrpSpPr>
+      <p:grpSpPr>
+        <a:xfrm>
+          <a:off x="0" y="0"/>
+          <a:ext cx="0" cy="0"/>
+          <a:chOff x="0" y="0"/>
+          <a:chExt cx="0" cy="0"/>
+        </a:xfrm>
+      </p:grpSpPr>
+      <p:sp>
+        <p:nvSpPr>
+          <p:cNvPr id="2" name="Title 1">
+            <a:extLst>
+              <a:ext uri="{FF2B5EF4-FFF2-40B4-BE49-F238E27FC236}">
+                <a16:creationId xmlns:a16="http://schemas.microsoft.com/office/drawing/2014/main" id="{2D4E4121-CDC8-41BA-846E-58655BA90FCF}"/>
+              </a:ext>
+            </a:extLst>
+          </p:cNvPr>
+          <p:cNvSpPr>
+            <a:spLocks noGrp="1"/>
+          </p:cNvSpPr>
+          <p:nvPr>
+            <p:ph type="ctrTitle"/>
+          </p:nvPr>
+        </p:nvSpPr>
+        <p:spPr>
+          <a:xfrm>
+            <a:off x="1507067" y="345351"/>
+            <a:ext cx="7766936" cy="970133"/>
+          </a:xfrm>
+        </p:spPr>
+        <p:txBody>
+          <a:bodyPr/>
+          <a:lstStyle/>
+          <a:p>
+            <a:pPr algn="l"/>
+            <a:r>
+              <a:rPr lang="en-US" dirty="0">
+                <a:solidFill>
+                  <a:schemeClr val="tx1">
+                    <a:lumMod val="85000"/>
+                    <a:lumOff val="15000"/>
+                  </a:schemeClr>
+                </a:solidFill>
+                <a:latin typeface="Segoe UI" panose="020B0502040204020203" pitchFamily="34" charset="0"/>
+                <a:cs typeface="Segoe UI" panose="020B0502040204020203" pitchFamily="34" charset="0"/>
+              </a:rPr>
+              <a:t>JS| </a:t>
+            </a:r>
+            <a:r>
+              <a:rPr lang="en-US" sz="3200" b="1" dirty="0">
+                <a:solidFill>
+                  <a:schemeClr val="tx1">
+                    <a:lumMod val="85000"/>
+                    <a:lumOff val="15000"/>
+                  </a:schemeClr>
+                </a:solidFill>
+                <a:latin typeface="Segoe UI" panose="020B0502040204020203" pitchFamily="34" charset="0"/>
+                <a:cs typeface="Segoe UI" panose="020B0502040204020203" pitchFamily="34" charset="0"/>
+              </a:rPr>
+              <a:t>Functions Properties</a:t>
+            </a:r>
+            <a:endParaRPr lang="en-US" b="1" dirty="0">
+              <a:solidFill>
+                <a:schemeClr val="tx1">
+                  <a:lumMod val="85000"/>
+                  <a:lumOff val="15000"/>
+                </a:schemeClr>
+              </a:solidFill>
+              <a:latin typeface="Segoe UI" panose="020B0502040204020203" pitchFamily="34" charset="0"/>
+              <a:cs typeface="Segoe UI" panose="020B0502040204020203" pitchFamily="34" charset="0"/>
+            </a:endParaRPr>
+          </a:p>
+        </p:txBody>
+      </p:sp>
+      <p:graphicFrame>
+        <p:nvGraphicFramePr>
+          <p:cNvPr id="3" name="Table 3">
+            <a:extLst>
+              <a:ext uri="{FF2B5EF4-FFF2-40B4-BE49-F238E27FC236}">
+                <a16:creationId xmlns:a16="http://schemas.microsoft.com/office/drawing/2014/main" id="{65C95392-F28C-4B9A-9DAC-BDF2F7294653}"/>
+              </a:ext>
+            </a:extLst>
+          </p:cNvPr>
+          <p:cNvGraphicFramePr>
+            <a:graphicFrameLocks noGrp="1"/>
+          </p:cNvGraphicFramePr>
+          <p:nvPr>
+            <p:extLst>
+              <p:ext uri="{D42A27DB-BD31-4B8C-83A1-F6EECF244321}">
+                <p14:modId xmlns:p14="http://schemas.microsoft.com/office/powerpoint/2010/main" val="2681976357"/>
+              </p:ext>
+            </p:extLst>
+          </p:nvPr>
+        </p:nvGraphicFramePr>
+        <p:xfrm>
+          <a:off x="1507065" y="1643512"/>
+          <a:ext cx="9616651" cy="2352040"/>
+        </p:xfrm>
+        <a:graphic>
+          <a:graphicData uri="http://schemas.openxmlformats.org/drawingml/2006/table">
+            <a:tbl>
+              <a:tblPr firstRow="1" bandRow="1">
+                <a:tableStyleId>{5C22544A-7EE6-4342-B048-85BDC9FD1C3A}</a:tableStyleId>
+              </a:tblPr>
+              <a:tblGrid>
+                <a:gridCol w="1872174">
+                  <a:extLst>
+                    <a:ext uri="{9D8B030D-6E8A-4147-A177-3AD203B41FA5}">
+                      <a16:colId xmlns:a16="http://schemas.microsoft.com/office/drawing/2014/main" val="641866772"/>
+                    </a:ext>
+                  </a:extLst>
+                </a:gridCol>
+                <a:gridCol w="7744477">
+                  <a:extLst>
+                    <a:ext uri="{9D8B030D-6E8A-4147-A177-3AD203B41FA5}">
+                      <a16:colId xmlns:a16="http://schemas.microsoft.com/office/drawing/2014/main" val="1998540311"/>
+                    </a:ext>
+                  </a:extLst>
+                </a:gridCol>
+              </a:tblGrid>
+              <a:tr h="370840">
+                <a:tc>
+                  <a:txBody>
+                    <a:bodyPr/>
+                    <a:lstStyle/>
+                    <a:p>
+                      <a:pPr algn="ctr"/>
+                      <a:r>
+                        <a:rPr lang="en-US" sz="1600" dirty="0">
+                          <a:solidFill>
+                            <a:schemeClr val="tx1"/>
+                          </a:solidFill>
+                          <a:latin typeface="Segoe UI" panose="020B0502040204020203" pitchFamily="34" charset="0"/>
+                          <a:cs typeface="Segoe UI" panose="020B0502040204020203" pitchFamily="34" charset="0"/>
+                        </a:rPr>
+                        <a:t>Property</a:t>
+                      </a:r>
+                    </a:p>
+                  </a:txBody>
+                  <a:tcPr anchor="ctr"/>
+                </a:tc>
+                <a:tc>
+                  <a:txBody>
+                    <a:bodyPr/>
+                    <a:lstStyle/>
+                    <a:p>
+                      <a:pPr algn="ctr"/>
+                      <a:r>
+                        <a:rPr lang="en-US" sz="1600" dirty="0">
+                          <a:solidFill>
+                            <a:schemeClr val="tx1"/>
+                          </a:solidFill>
+                          <a:latin typeface="Segoe UI" panose="020B0502040204020203" pitchFamily="34" charset="0"/>
+                          <a:cs typeface="Segoe UI" panose="020B0502040204020203" pitchFamily="34" charset="0"/>
+                        </a:rPr>
+                        <a:t>Description</a:t>
+                      </a:r>
+                    </a:p>
+                  </a:txBody>
+                  <a:tcPr anchor="ctr"/>
+                </a:tc>
+                <a:extLst>
+                  <a:ext uri="{0D108BD9-81ED-4DB2-BD59-A6C34878D82A}">
+                    <a16:rowId xmlns:a16="http://schemas.microsoft.com/office/drawing/2014/main" val="2204528887"/>
+                  </a:ext>
+                </a:extLst>
+              </a:tr>
+              <a:tr h="370840">
+                <a:tc>
+                  <a:txBody>
+                    <a:bodyPr/>
+                    <a:lstStyle/>
+                    <a:p>
+                      <a:r>
+                        <a:rPr lang="en-US" sz="1600" b="1" dirty="0">
+                          <a:latin typeface="Segoe UI" panose="020B0502040204020203" pitchFamily="34" charset="0"/>
+                          <a:cs typeface="Segoe UI" panose="020B0502040204020203" pitchFamily="34" charset="0"/>
+                        </a:rPr>
+                        <a:t>Length</a:t>
+                      </a:r>
+                    </a:p>
+                  </a:txBody>
+                  <a:tcPr anchor="ctr"/>
+                </a:tc>
+                <a:tc>
+                  <a:txBody>
+                    <a:bodyPr/>
+                    <a:lstStyle/>
+                    <a:p>
+                      <a:r>
+                        <a:rPr lang="en-US" sz="1600" dirty="0">
+                          <a:latin typeface="Segoe UI" panose="020B0502040204020203" pitchFamily="34" charset="0"/>
+                          <a:cs typeface="Segoe UI" panose="020B0502040204020203" pitchFamily="34" charset="0"/>
+                        </a:rPr>
+                        <a:t>The </a:t>
+                      </a:r>
+                      <a:r>
+                        <a:rPr lang="en-US" sz="1600" b="1" dirty="0">
+                          <a:latin typeface="Segoe UI" panose="020B0502040204020203" pitchFamily="34" charset="0"/>
+                          <a:cs typeface="Segoe UI" panose="020B0502040204020203" pitchFamily="34" charset="0"/>
+                        </a:rPr>
+                        <a:t>read-only</a:t>
+                      </a:r>
+                      <a:r>
+                        <a:rPr lang="en-US" sz="1600" dirty="0">
+                          <a:latin typeface="Segoe UI" panose="020B0502040204020203" pitchFamily="34" charset="0"/>
+                          <a:cs typeface="Segoe UI" panose="020B0502040204020203" pitchFamily="34" charset="0"/>
+                        </a:rPr>
+                        <a:t> length property of a function specifies the </a:t>
+                      </a:r>
+                      <a:r>
+                        <a:rPr lang="en-US" sz="1600" b="1" dirty="0">
+                          <a:latin typeface="Segoe UI" panose="020B0502040204020203" pitchFamily="34" charset="0"/>
+                          <a:cs typeface="Segoe UI" panose="020B0502040204020203" pitchFamily="34" charset="0"/>
+                        </a:rPr>
+                        <a:t>arity</a:t>
+                      </a:r>
+                      <a:r>
+                        <a:rPr lang="en-US" sz="1600" dirty="0">
+                          <a:latin typeface="Segoe UI" panose="020B0502040204020203" pitchFamily="34" charset="0"/>
+                          <a:cs typeface="Segoe UI" panose="020B0502040204020203" pitchFamily="34" charset="0"/>
+                        </a:rPr>
+                        <a:t> of the function.</a:t>
+                      </a:r>
+                    </a:p>
+                    <a:p>
+                      <a:r>
+                        <a:rPr lang="en-US" sz="1600" dirty="0">
+                          <a:latin typeface="Segoe UI" panose="020B0502040204020203" pitchFamily="34" charset="0"/>
+                          <a:cs typeface="Segoe UI" panose="020B0502040204020203" pitchFamily="34" charset="0"/>
+                        </a:rPr>
+                        <a:t>The </a:t>
+                      </a:r>
+                      <a:r>
+                        <a:rPr lang="en-US" sz="1600" b="1" dirty="0">
+                          <a:latin typeface="Segoe UI" panose="020B0502040204020203" pitchFamily="34" charset="0"/>
+                          <a:cs typeface="Segoe UI" panose="020B0502040204020203" pitchFamily="34" charset="0"/>
+                        </a:rPr>
+                        <a:t>number of parameters </a:t>
+                      </a:r>
+                      <a:r>
+                        <a:rPr lang="en-US" sz="1600" dirty="0">
+                          <a:latin typeface="Segoe UI" panose="020B0502040204020203" pitchFamily="34" charset="0"/>
+                          <a:cs typeface="Segoe UI" panose="020B0502040204020203" pitchFamily="34" charset="0"/>
+                        </a:rPr>
+                        <a:t>it declares in its parameter list, which is usually the </a:t>
+                      </a:r>
+                      <a:r>
+                        <a:rPr lang="en-US" sz="1600" b="1" dirty="0">
+                          <a:latin typeface="Segoe UI" panose="020B0502040204020203" pitchFamily="34" charset="0"/>
+                          <a:cs typeface="Segoe UI" panose="020B0502040204020203" pitchFamily="34" charset="0"/>
+                        </a:rPr>
+                        <a:t>number of arguments </a:t>
+                      </a:r>
+                      <a:r>
+                        <a:rPr lang="en-US" sz="1600" dirty="0">
+                          <a:latin typeface="Segoe UI" panose="020B0502040204020203" pitchFamily="34" charset="0"/>
+                          <a:cs typeface="Segoe UI" panose="020B0502040204020203" pitchFamily="34" charset="0"/>
+                        </a:rPr>
+                        <a:t>that the function expects.</a:t>
+                      </a:r>
+                    </a:p>
+                  </a:txBody>
+                  <a:tcPr anchor="ctr"/>
+                </a:tc>
+                <a:extLst>
+                  <a:ext uri="{0D108BD9-81ED-4DB2-BD59-A6C34878D82A}">
+                    <a16:rowId xmlns:a16="http://schemas.microsoft.com/office/drawing/2014/main" val="2887405685"/>
+                  </a:ext>
+                </a:extLst>
+              </a:tr>
+              <a:tr h="370840">
+                <a:tc>
+                  <a:txBody>
+                    <a:bodyPr/>
+                    <a:lstStyle/>
+                    <a:p>
+                      <a:r>
+                        <a:rPr lang="en-US" sz="1600" b="1" dirty="0">
+                          <a:latin typeface="Segoe UI" panose="020B0502040204020203" pitchFamily="34" charset="0"/>
+                          <a:cs typeface="Segoe UI" panose="020B0502040204020203" pitchFamily="34" charset="0"/>
+                        </a:rPr>
+                        <a:t>Name</a:t>
+                      </a:r>
+                    </a:p>
+                  </a:txBody>
+                  <a:tcPr anchor="ctr"/>
+                </a:tc>
+                <a:tc>
+                  <a:txBody>
+                    <a:bodyPr/>
+                    <a:lstStyle/>
+                    <a:p>
+                      <a:r>
+                        <a:rPr lang="en-US" sz="1600" dirty="0">
+                          <a:latin typeface="Segoe UI" panose="020B0502040204020203" pitchFamily="34" charset="0"/>
+                          <a:cs typeface="Segoe UI" panose="020B0502040204020203" pitchFamily="34" charset="0"/>
+                        </a:rPr>
+                        <a:t>The </a:t>
+                      </a:r>
+                      <a:r>
+                        <a:rPr lang="en-US" sz="1600" b="1" dirty="0">
+                          <a:latin typeface="Segoe UI" panose="020B0502040204020203" pitchFamily="34" charset="0"/>
+                          <a:cs typeface="Segoe UI" panose="020B0502040204020203" pitchFamily="34" charset="0"/>
+                        </a:rPr>
+                        <a:t>read-only</a:t>
+                      </a:r>
+                      <a:r>
+                        <a:rPr lang="en-US" sz="1600" dirty="0">
+                          <a:latin typeface="Segoe UI" panose="020B0502040204020203" pitchFamily="34" charset="0"/>
+                          <a:cs typeface="Segoe UI" panose="020B0502040204020203" pitchFamily="34" charset="0"/>
+                        </a:rPr>
+                        <a:t> name property of a function specifies the name that was used when the function was defined,</a:t>
+                      </a:r>
+                    </a:p>
+                  </a:txBody>
+                  <a:tcPr anchor="ctr"/>
+                </a:tc>
+                <a:extLst>
+                  <a:ext uri="{0D108BD9-81ED-4DB2-BD59-A6C34878D82A}">
+                    <a16:rowId xmlns:a16="http://schemas.microsoft.com/office/drawing/2014/main" val="1418400334"/>
+                  </a:ext>
+                </a:extLst>
+              </a:tr>
+              <a:tr h="370840">
+                <a:tc>
+                  <a:txBody>
+                    <a:bodyPr/>
+                    <a:lstStyle/>
+                    <a:p>
+                      <a:r>
+                        <a:rPr lang="en-US" sz="1600" b="1" dirty="0">
+                          <a:latin typeface="Segoe UI" panose="020B0502040204020203" pitchFamily="34" charset="0"/>
+                          <a:cs typeface="Segoe UI" panose="020B0502040204020203" pitchFamily="34" charset="0"/>
+                        </a:rPr>
+                        <a:t>Prototype</a:t>
+                      </a:r>
+                    </a:p>
+                  </a:txBody>
+                  <a:tcPr anchor="ctr"/>
+                </a:tc>
+                <a:tc>
+                  <a:txBody>
+                    <a:bodyPr/>
+                    <a:lstStyle/>
+                    <a:p>
+                      <a:r>
+                        <a:rPr lang="en-US" sz="1600" dirty="0">
+                          <a:latin typeface="Segoe UI" panose="020B0502040204020203" pitchFamily="34" charset="0"/>
+                          <a:cs typeface="Segoe UI" panose="020B0502040204020203" pitchFamily="34" charset="0"/>
+                        </a:rPr>
+                        <a:t>All functions, except arrow functions, have a prototype property that </a:t>
+                      </a:r>
+                      <a:r>
+                        <a:rPr lang="en-US" sz="1600" b="1" dirty="0">
+                          <a:latin typeface="Segoe UI" panose="020B0502040204020203" pitchFamily="34" charset="0"/>
+                          <a:cs typeface="Segoe UI" panose="020B0502040204020203" pitchFamily="34" charset="0"/>
+                        </a:rPr>
+                        <a:t>refers</a:t>
+                      </a:r>
+                      <a:r>
+                        <a:rPr lang="en-US" sz="1600" dirty="0">
+                          <a:latin typeface="Segoe UI" panose="020B0502040204020203" pitchFamily="34" charset="0"/>
+                          <a:cs typeface="Segoe UI" panose="020B0502040204020203" pitchFamily="34" charset="0"/>
+                        </a:rPr>
+                        <a:t> to an object known as the </a:t>
+                      </a:r>
+                      <a:r>
+                        <a:rPr lang="en-US" sz="1600" b="1" dirty="0">
+                          <a:latin typeface="Segoe UI" panose="020B0502040204020203" pitchFamily="34" charset="0"/>
+                          <a:cs typeface="Segoe UI" panose="020B0502040204020203" pitchFamily="34" charset="0"/>
+                        </a:rPr>
+                        <a:t>prototype</a:t>
+                      </a:r>
+                      <a:r>
+                        <a:rPr lang="en-US" sz="1600" dirty="0">
+                          <a:latin typeface="Segoe UI" panose="020B0502040204020203" pitchFamily="34" charset="0"/>
+                          <a:cs typeface="Segoe UI" panose="020B0502040204020203" pitchFamily="34" charset="0"/>
+                        </a:rPr>
+                        <a:t> </a:t>
+                      </a:r>
+                      <a:r>
+                        <a:rPr lang="en-US" sz="1600" b="1" dirty="0">
+                          <a:latin typeface="Segoe UI" panose="020B0502040204020203" pitchFamily="34" charset="0"/>
+                          <a:cs typeface="Segoe UI" panose="020B0502040204020203" pitchFamily="34" charset="0"/>
+                        </a:rPr>
+                        <a:t>object</a:t>
+                      </a:r>
+                      <a:r>
+                        <a:rPr lang="en-US" sz="1600" dirty="0">
+                          <a:latin typeface="Segoe UI" panose="020B0502040204020203" pitchFamily="34" charset="0"/>
+                          <a:cs typeface="Segoe UI" panose="020B0502040204020203" pitchFamily="34" charset="0"/>
+                        </a:rPr>
+                        <a:t>.</a:t>
+                      </a:r>
+                    </a:p>
+                  </a:txBody>
+                  <a:tcPr anchor="ctr"/>
+                </a:tc>
+                <a:extLst>
+                  <a:ext uri="{0D108BD9-81ED-4DB2-BD59-A6C34878D82A}">
+                    <a16:rowId xmlns:a16="http://schemas.microsoft.com/office/drawing/2014/main" val="907471095"/>
+                  </a:ext>
+                </a:extLst>
+              </a:tr>
+            </a:tbl>
+          </a:graphicData>
+        </a:graphic>
+      </p:graphicFrame>
+    </p:spTree>
+    <p:extLst>
+      <p:ext uri="{BB962C8B-B14F-4D97-AF65-F5344CB8AC3E}">
+        <p14:creationId xmlns:p14="http://schemas.microsoft.com/office/powerpoint/2010/main" val="4159599001"/>
+      </p:ext>
+    </p:extLst>
+  </p:cSld>
+  <p:clrMapOvr>
+    <a:masterClrMapping/>
+  </p:clrMapOvr>
+</p:sld>
+</file>
+
+<file path=ppt/slides/slide49.xml><?xml version="1.0" encoding="utf-8"?>
+<p:sld xmlns:a="http://schemas.openxmlformats.org/drawingml/2006/main" xmlns:r="http://schemas.openxmlformats.org/officeDocument/2006/relationships" xmlns:p="http://schemas.openxmlformats.org/presentationml/2006/main">
+  <p:cSld>
+    <p:spTree>
+      <p:nvGrpSpPr>
+        <p:cNvPr id="1" name=""/>
+        <p:cNvGrpSpPr/>
+        <p:nvPr/>
+      </p:nvGrpSpPr>
+      <p:grpSpPr>
+        <a:xfrm>
+          <a:off x="0" y="0"/>
+          <a:ext cx="0" cy="0"/>
+          <a:chOff x="0" y="0"/>
+          <a:chExt cx="0" cy="0"/>
+        </a:xfrm>
+      </p:grpSpPr>
+      <p:sp>
+        <p:nvSpPr>
+          <p:cNvPr id="2" name="Title 1">
+            <a:extLst>
+              <a:ext uri="{FF2B5EF4-FFF2-40B4-BE49-F238E27FC236}">
+                <a16:creationId xmlns:a16="http://schemas.microsoft.com/office/drawing/2014/main" id="{2D4E4121-CDC8-41BA-846E-58655BA90FCF}"/>
+              </a:ext>
+            </a:extLst>
+          </p:cNvPr>
+          <p:cNvSpPr>
+            <a:spLocks noGrp="1"/>
+          </p:cNvSpPr>
+          <p:nvPr>
+            <p:ph type="ctrTitle"/>
+          </p:nvPr>
+        </p:nvSpPr>
+        <p:spPr>
+          <a:xfrm>
+            <a:off x="1507067" y="345351"/>
+            <a:ext cx="7766936" cy="970133"/>
+          </a:xfrm>
+        </p:spPr>
+        <p:txBody>
+          <a:bodyPr/>
+          <a:lstStyle/>
+          <a:p>
+            <a:pPr algn="l"/>
+            <a:r>
+              <a:rPr lang="en-US" dirty="0">
+                <a:solidFill>
+                  <a:schemeClr val="tx1">
+                    <a:lumMod val="85000"/>
+                    <a:lumOff val="15000"/>
+                  </a:schemeClr>
+                </a:solidFill>
+                <a:latin typeface="Segoe UI" panose="020B0502040204020203" pitchFamily="34" charset="0"/>
+                <a:cs typeface="Segoe UI" panose="020B0502040204020203" pitchFamily="34" charset="0"/>
+              </a:rPr>
+              <a:t>JS| </a:t>
+            </a:r>
+            <a:r>
+              <a:rPr lang="en-US" sz="3200" b="1" dirty="0">
+                <a:solidFill>
+                  <a:schemeClr val="tx1">
+                    <a:lumMod val="85000"/>
+                    <a:lumOff val="15000"/>
+                  </a:schemeClr>
+                </a:solidFill>
+                <a:latin typeface="Segoe UI" panose="020B0502040204020203" pitchFamily="34" charset="0"/>
+                <a:cs typeface="Segoe UI" panose="020B0502040204020203" pitchFamily="34" charset="0"/>
+              </a:rPr>
+              <a:t>Functions Methos - Call</a:t>
+            </a:r>
+            <a:endParaRPr lang="en-US" b="1" dirty="0">
+              <a:solidFill>
+                <a:schemeClr val="tx1">
+                  <a:lumMod val="85000"/>
+                  <a:lumOff val="15000"/>
+                </a:schemeClr>
+              </a:solidFill>
+              <a:latin typeface="Segoe UI" panose="020B0502040204020203" pitchFamily="34" charset="0"/>
+              <a:cs typeface="Segoe UI" panose="020B0502040204020203" pitchFamily="34" charset="0"/>
+            </a:endParaRPr>
+          </a:p>
+        </p:txBody>
+      </p:sp>
+      <p:sp>
+        <p:nvSpPr>
+          <p:cNvPr id="5" name="TextBox 4">
+            <a:extLst>
+              <a:ext uri="{FF2B5EF4-FFF2-40B4-BE49-F238E27FC236}">
+                <a16:creationId xmlns:a16="http://schemas.microsoft.com/office/drawing/2014/main" id="{4CD014A6-AE50-491B-8A43-4EDBA1ECD36C}"/>
+              </a:ext>
+            </a:extLst>
+          </p:cNvPr>
+          <p:cNvSpPr txBox="1"/>
+          <p:nvPr/>
+        </p:nvSpPr>
+        <p:spPr>
+          <a:xfrm>
+            <a:off x="1507066" y="1643512"/>
+            <a:ext cx="9616652" cy="1569660"/>
+          </a:xfrm>
+          <a:prstGeom prst="rect">
+            <a:avLst/>
+          </a:prstGeom>
+          <a:noFill/>
+        </p:spPr>
+        <p:txBody>
+          <a:bodyPr wrap="square">
+            <a:spAutoFit/>
+          </a:bodyPr>
+          <a:lstStyle/>
+          <a:p>
+            <a:pPr algn="just"/>
+            <a:r>
+              <a:rPr lang="en-US" sz="1600" dirty="0">
+                <a:latin typeface="Segoe UI" panose="020B0502040204020203" pitchFamily="34" charset="0"/>
+                <a:cs typeface="Segoe UI" panose="020B0502040204020203" pitchFamily="34" charset="0"/>
+              </a:rPr>
+              <a:t>Allow you to </a:t>
+            </a:r>
+            <a:r>
+              <a:rPr lang="en-US" sz="1600" b="1" dirty="0">
+                <a:latin typeface="Segoe UI" panose="020B0502040204020203" pitchFamily="34" charset="0"/>
+                <a:cs typeface="Segoe UI" panose="020B0502040204020203" pitchFamily="34" charset="0"/>
+              </a:rPr>
+              <a:t>indirectly invoke </a:t>
+            </a:r>
+            <a:r>
+              <a:rPr lang="en-US" sz="1600" dirty="0">
+                <a:latin typeface="Segoe UI" panose="020B0502040204020203" pitchFamily="34" charset="0"/>
+                <a:cs typeface="Segoe UI" panose="020B0502040204020203" pitchFamily="34" charset="0"/>
+              </a:rPr>
+              <a:t>a function as if it were a method of some other object. </a:t>
+            </a:r>
+          </a:p>
+          <a:p>
+            <a:pPr algn="just"/>
+            <a:endParaRPr lang="en-US" sz="1600" dirty="0">
+              <a:latin typeface="Segoe UI" panose="020B0502040204020203" pitchFamily="34" charset="0"/>
+              <a:cs typeface="Segoe UI" panose="020B0502040204020203" pitchFamily="34" charset="0"/>
+            </a:endParaRPr>
+          </a:p>
+          <a:p>
+            <a:pPr algn="just"/>
+            <a:r>
+              <a:rPr lang="en-US" sz="1600" dirty="0">
+                <a:latin typeface="Segoe UI" panose="020B0502040204020203" pitchFamily="34" charset="0"/>
+                <a:cs typeface="Segoe UI" panose="020B0502040204020203" pitchFamily="34" charset="0"/>
+              </a:rPr>
+              <a:t>The </a:t>
+            </a:r>
+            <a:r>
+              <a:rPr lang="en-US" sz="1600" b="1" dirty="0">
+                <a:latin typeface="Segoe UI" panose="020B0502040204020203" pitchFamily="34" charset="0"/>
+                <a:cs typeface="Segoe UI" panose="020B0502040204020203" pitchFamily="34" charset="0"/>
+              </a:rPr>
+              <a:t>first argument </a:t>
+            </a:r>
+            <a:r>
+              <a:rPr lang="en-US" sz="1600" dirty="0">
+                <a:latin typeface="Segoe UI" panose="020B0502040204020203" pitchFamily="34" charset="0"/>
+                <a:cs typeface="Segoe UI" panose="020B0502040204020203" pitchFamily="34" charset="0"/>
+              </a:rPr>
+              <a:t>is the object on which the function is to be invoked; this argument is the </a:t>
+            </a:r>
+            <a:r>
+              <a:rPr lang="en-US" sz="1600" b="1" dirty="0">
+                <a:latin typeface="Segoe UI" panose="020B0502040204020203" pitchFamily="34" charset="0"/>
+                <a:cs typeface="Segoe UI" panose="020B0502040204020203" pitchFamily="34" charset="0"/>
+              </a:rPr>
+              <a:t>invocation context </a:t>
+            </a:r>
+            <a:r>
+              <a:rPr lang="en-US" sz="1600" dirty="0">
+                <a:latin typeface="Segoe UI" panose="020B0502040204020203" pitchFamily="34" charset="0"/>
+                <a:cs typeface="Segoe UI" panose="020B0502040204020203" pitchFamily="34" charset="0"/>
+              </a:rPr>
+              <a:t>and becomes the value of the </a:t>
+            </a:r>
+            <a:r>
+              <a:rPr lang="en-US" sz="1600" b="1" dirty="0">
+                <a:latin typeface="Segoe UI" panose="020B0502040204020203" pitchFamily="34" charset="0"/>
+                <a:cs typeface="Segoe UI" panose="020B0502040204020203" pitchFamily="34" charset="0"/>
+              </a:rPr>
+              <a:t>this </a:t>
+            </a:r>
+            <a:r>
+              <a:rPr lang="en-US" sz="1600" dirty="0">
+                <a:latin typeface="Segoe UI" panose="020B0502040204020203" pitchFamily="34" charset="0"/>
+                <a:cs typeface="Segoe UI" panose="020B0502040204020203" pitchFamily="34" charset="0"/>
+              </a:rPr>
+              <a:t>keyword within the body of the function.</a:t>
+            </a:r>
+          </a:p>
+          <a:p>
+            <a:pPr algn="just"/>
+            <a:endParaRPr lang="en-US" sz="1600" dirty="0">
+              <a:latin typeface="Segoe UI" panose="020B0502040204020203" pitchFamily="34" charset="0"/>
+              <a:cs typeface="Segoe UI" panose="020B0502040204020203" pitchFamily="34" charset="0"/>
+            </a:endParaRPr>
+          </a:p>
+          <a:p>
+            <a:pPr algn="just"/>
+            <a:r>
+              <a:rPr lang="en-US" sz="1600" dirty="0">
+                <a:latin typeface="Segoe UI" panose="020B0502040204020203" pitchFamily="34" charset="0"/>
+                <a:cs typeface="Segoe UI" panose="020B0502040204020203" pitchFamily="34" charset="0"/>
+              </a:rPr>
+              <a:t>Any arguments to call() </a:t>
+            </a:r>
+            <a:r>
+              <a:rPr lang="en-US" sz="1600" b="1" dirty="0">
+                <a:latin typeface="Segoe UI" panose="020B0502040204020203" pitchFamily="34" charset="0"/>
+                <a:cs typeface="Segoe UI" panose="020B0502040204020203" pitchFamily="34" charset="0"/>
+              </a:rPr>
+              <a:t>after the first</a:t>
+            </a:r>
+            <a:r>
+              <a:rPr lang="en-US" sz="1600" dirty="0">
+                <a:latin typeface="Segoe UI" panose="020B0502040204020203" pitchFamily="34" charset="0"/>
+                <a:cs typeface="Segoe UI" panose="020B0502040204020203" pitchFamily="34" charset="0"/>
+              </a:rPr>
+              <a:t> are the </a:t>
+            </a:r>
+            <a:r>
+              <a:rPr lang="en-US" sz="1600" b="1" dirty="0">
+                <a:latin typeface="Segoe UI" panose="020B0502040204020203" pitchFamily="34" charset="0"/>
+                <a:cs typeface="Segoe UI" panose="020B0502040204020203" pitchFamily="34" charset="0"/>
+              </a:rPr>
+              <a:t>values </a:t>
+            </a:r>
+            <a:r>
+              <a:rPr lang="en-US" sz="1600" dirty="0">
+                <a:latin typeface="Segoe UI" panose="020B0502040204020203" pitchFamily="34" charset="0"/>
+                <a:cs typeface="Segoe UI" panose="020B0502040204020203" pitchFamily="34" charset="0"/>
+              </a:rPr>
+              <a:t>that are </a:t>
+            </a:r>
+            <a:r>
+              <a:rPr lang="en-US" sz="1600" b="1" dirty="0">
+                <a:latin typeface="Segoe UI" panose="020B0502040204020203" pitchFamily="34" charset="0"/>
+                <a:cs typeface="Segoe UI" panose="020B0502040204020203" pitchFamily="34" charset="0"/>
+              </a:rPr>
+              <a:t>passed </a:t>
+            </a:r>
+            <a:r>
+              <a:rPr lang="en-US" sz="1600" dirty="0">
+                <a:latin typeface="Segoe UI" panose="020B0502040204020203" pitchFamily="34" charset="0"/>
+                <a:cs typeface="Segoe UI" panose="020B0502040204020203" pitchFamily="34" charset="0"/>
+              </a:rPr>
+              <a:t>to the function that is invoked:</a:t>
+            </a:r>
+          </a:p>
+        </p:txBody>
+      </p:sp>
+      <p:sp>
+        <p:nvSpPr>
+          <p:cNvPr id="7" name="TextBox 6">
+            <a:extLst>
+              <a:ext uri="{FF2B5EF4-FFF2-40B4-BE49-F238E27FC236}">
+                <a16:creationId xmlns:a16="http://schemas.microsoft.com/office/drawing/2014/main" id="{5F818836-65B3-4384-8B51-4FB093241FAE}"/>
+              </a:ext>
+            </a:extLst>
+          </p:cNvPr>
+          <p:cNvSpPr txBox="1"/>
+          <p:nvPr/>
+        </p:nvSpPr>
+        <p:spPr>
+          <a:xfrm>
+            <a:off x="1507066" y="3541200"/>
+            <a:ext cx="1653384" cy="369332"/>
+          </a:xfrm>
+          <a:prstGeom prst="rect">
+            <a:avLst/>
+          </a:prstGeom>
+          <a:noFill/>
+          <a:ln w="57150">
+            <a:solidFill>
+              <a:srgbClr val="0070C0"/>
+            </a:solidFill>
+          </a:ln>
+        </p:spPr>
+        <p:txBody>
+          <a:bodyPr wrap="square">
+            <a:spAutoFit/>
+          </a:bodyPr>
+          <a:lstStyle/>
+          <a:p>
+            <a:pPr algn="just"/>
+            <a:r>
+              <a:rPr lang="en-US" sz="1800" dirty="0" err="1">
+                <a:latin typeface="Segoe UI" panose="020B0502040204020203" pitchFamily="34" charset="0"/>
+                <a:cs typeface="Segoe UI" panose="020B0502040204020203" pitchFamily="34" charset="0"/>
+              </a:rPr>
+              <a:t>f.call</a:t>
+            </a:r>
+            <a:r>
+              <a:rPr lang="en-US" sz="1800" dirty="0">
+                <a:latin typeface="Segoe UI" panose="020B0502040204020203" pitchFamily="34" charset="0"/>
+                <a:cs typeface="Segoe UI" panose="020B0502040204020203" pitchFamily="34" charset="0"/>
+              </a:rPr>
+              <a:t>( o, 1, 2);</a:t>
+            </a:r>
+          </a:p>
+        </p:txBody>
+      </p:sp>
+      <p:sp>
+        <p:nvSpPr>
+          <p:cNvPr id="9" name="TextBox 8">
+            <a:extLst>
+              <a:ext uri="{FF2B5EF4-FFF2-40B4-BE49-F238E27FC236}">
+                <a16:creationId xmlns:a16="http://schemas.microsoft.com/office/drawing/2014/main" id="{38611520-9551-41FB-B8F2-D71385F2971B}"/>
+              </a:ext>
+            </a:extLst>
+          </p:cNvPr>
+          <p:cNvSpPr txBox="1"/>
+          <p:nvPr/>
+        </p:nvSpPr>
+        <p:spPr>
+          <a:xfrm>
+            <a:off x="1507065" y="4238560"/>
+            <a:ext cx="9616651" cy="338554"/>
+          </a:xfrm>
+          <a:prstGeom prst="rect">
+            <a:avLst/>
+          </a:prstGeom>
+          <a:solidFill>
+            <a:srgbClr val="FFE7B7"/>
+          </a:solidFill>
+          <a:ln w="57150">
+            <a:solidFill>
+              <a:srgbClr val="FFC000"/>
+            </a:solidFill>
+          </a:ln>
+        </p:spPr>
+        <p:txBody>
+          <a:bodyPr wrap="square">
+            <a:spAutoFit/>
+          </a:bodyPr>
+          <a:lstStyle/>
+          <a:p>
+            <a:r>
+              <a:rPr lang="en-US" sz="1600" dirty="0">
+                <a:latin typeface="Segoe UI" panose="020B0502040204020203" pitchFamily="34" charset="0"/>
+                <a:cs typeface="Segoe UI" panose="020B0502040204020203" pitchFamily="34" charset="0"/>
+              </a:rPr>
+              <a:t>Remember that arrow functions inherit the this value of the context where they are defined.</a:t>
+            </a:r>
+          </a:p>
+        </p:txBody>
+      </p:sp>
+    </p:spTree>
+    <p:extLst>
+      <p:ext uri="{BB962C8B-B14F-4D97-AF65-F5344CB8AC3E}">
+        <p14:creationId xmlns:p14="http://schemas.microsoft.com/office/powerpoint/2010/main" val="3457922124"/>
+      </p:ext>
+    </p:extLst>
+  </p:cSld>
+  <p:clrMapOvr>
+    <a:masterClrMapping/>
+  </p:clrMapOvr>
+</p:sld>
+</file>
+
+<file path=ppt/slides/slide5.xml><?xml version="1.0" encoding="utf-8"?>
+<p:sld xmlns:a="http://schemas.openxmlformats.org/drawingml/2006/main" xmlns:r="http://schemas.openxmlformats.org/officeDocument/2006/relationships" xmlns:p="http://schemas.openxmlformats.org/presentationml/2006/main">
+  <p:cSld>
+    <p:spTree>
+      <p:nvGrpSpPr>
+        <p:cNvPr id="1" name=""/>
+        <p:cNvGrpSpPr/>
+        <p:nvPr/>
+      </p:nvGrpSpPr>
+      <p:grpSpPr>
+        <a:xfrm>
+          <a:off x="0" y="0"/>
+          <a:ext cx="0" cy="0"/>
+          <a:chOff x="0" y="0"/>
+          <a:chExt cx="0" cy="0"/>
+        </a:xfrm>
+      </p:grpSpPr>
+      <p:sp>
+        <p:nvSpPr>
+          <p:cNvPr id="6" name="TextBox 5">
+            <a:extLst>
+              <a:ext uri="{FF2B5EF4-FFF2-40B4-BE49-F238E27FC236}">
+                <a16:creationId xmlns:a16="http://schemas.microsoft.com/office/drawing/2014/main" id="{58347EA0-F5FD-4C3F-8B86-AD1D1071EF8B}"/>
+              </a:ext>
+            </a:extLst>
+          </p:cNvPr>
+          <p:cNvSpPr txBox="1"/>
+          <p:nvPr/>
+        </p:nvSpPr>
+        <p:spPr>
+          <a:xfrm>
+            <a:off x="1507066" y="2564605"/>
+            <a:ext cx="9489586" cy="923330"/>
+          </a:xfrm>
+          <a:prstGeom prst="rect">
+            <a:avLst/>
+          </a:prstGeom>
+          <a:solidFill>
+            <a:schemeClr val="accent3">
+              <a:lumMod val="60000"/>
+              <a:lumOff val="40000"/>
+            </a:schemeClr>
+          </a:solidFill>
+          <a:ln w="57150">
+            <a:solidFill>
+              <a:srgbClr val="00B050"/>
+            </a:solidFill>
+          </a:ln>
+        </p:spPr>
+        <p:txBody>
+          <a:bodyPr wrap="square">
+            <a:spAutoFit/>
+          </a:bodyPr>
+          <a:lstStyle/>
+          <a:p>
+            <a:r>
+              <a:rPr lang="en-US" b="1" dirty="0">
+                <a:latin typeface="Segoe UI" panose="020B0502040204020203" pitchFamily="34" charset="0"/>
+                <a:cs typeface="Segoe UI" panose="020B0502040204020203" pitchFamily="34" charset="0"/>
+              </a:rPr>
+              <a:t>EXECUTION-CONTEXT:</a:t>
+            </a:r>
+          </a:p>
+          <a:p>
+            <a:endParaRPr lang="en-US" dirty="0">
+              <a:latin typeface="Segoe UI" panose="020B0502040204020203" pitchFamily="34" charset="0"/>
+              <a:cs typeface="Segoe UI" panose="020B0502040204020203" pitchFamily="34" charset="0"/>
+            </a:endParaRPr>
+          </a:p>
+          <a:p>
+            <a:r>
+              <a:rPr lang="en-US" dirty="0">
+                <a:latin typeface="Segoe UI" panose="020B0502040204020203" pitchFamily="34" charset="0"/>
+                <a:cs typeface="Segoe UI" panose="020B0502040204020203" pitchFamily="34" charset="0"/>
+              </a:rPr>
+              <a:t>They defining their own invocation context.</a:t>
+            </a:r>
+          </a:p>
+        </p:txBody>
+      </p:sp>
+      <p:sp>
+        <p:nvSpPr>
+          <p:cNvPr id="9" name="TextBox 8">
+            <a:extLst>
+              <a:ext uri="{FF2B5EF4-FFF2-40B4-BE49-F238E27FC236}">
+                <a16:creationId xmlns:a16="http://schemas.microsoft.com/office/drawing/2014/main" id="{0E5D8058-EB78-4D5B-B4C3-0B087F783CEE}"/>
+              </a:ext>
+            </a:extLst>
+          </p:cNvPr>
+          <p:cNvSpPr txBox="1"/>
+          <p:nvPr/>
+        </p:nvSpPr>
+        <p:spPr>
+          <a:xfrm>
+            <a:off x="1507066" y="1616879"/>
+            <a:ext cx="9489586" cy="646331"/>
+          </a:xfrm>
+          <a:prstGeom prst="rect">
+            <a:avLst/>
+          </a:prstGeom>
+          <a:solidFill>
+            <a:srgbClr val="F6B3AA"/>
+          </a:solidFill>
+          <a:ln w="57150">
+            <a:solidFill>
+              <a:srgbClr val="C00000"/>
+            </a:solidFill>
+          </a:ln>
+        </p:spPr>
+        <p:txBody>
+          <a:bodyPr wrap="square">
+            <a:spAutoFit/>
+          </a:bodyPr>
+          <a:lstStyle/>
+          <a:p>
+            <a:r>
+              <a:rPr lang="en-US" dirty="0">
+                <a:latin typeface="Segoe UI" panose="020B0502040204020203" pitchFamily="34" charset="0"/>
+                <a:cs typeface="Segoe UI" panose="020B0502040204020203" pitchFamily="34" charset="0"/>
+              </a:rPr>
+              <a:t>They </a:t>
+            </a:r>
+            <a:r>
+              <a:rPr lang="en-US" b="1" dirty="0">
+                <a:latin typeface="Segoe UI" panose="020B0502040204020203" pitchFamily="34" charset="0"/>
+                <a:cs typeface="Segoe UI" panose="020B0502040204020203" pitchFamily="34" charset="0"/>
+              </a:rPr>
+              <a:t>have a prototype property, </a:t>
+            </a:r>
+            <a:r>
+              <a:rPr lang="en-US" dirty="0">
+                <a:latin typeface="Segoe UI" panose="020B0502040204020203" pitchFamily="34" charset="0"/>
+                <a:cs typeface="Segoe UI" panose="020B0502040204020203" pitchFamily="34" charset="0"/>
+              </a:rPr>
+              <a:t>which means that they can be used as constructor functions for new classes.</a:t>
+            </a:r>
+          </a:p>
+        </p:txBody>
+      </p:sp>
+      <p:sp>
+        <p:nvSpPr>
+          <p:cNvPr id="2" name="Title 1">
+            <a:extLst>
+              <a:ext uri="{FF2B5EF4-FFF2-40B4-BE49-F238E27FC236}">
+                <a16:creationId xmlns:a16="http://schemas.microsoft.com/office/drawing/2014/main" id="{2D4E4121-CDC8-41BA-846E-58655BA90FCF}"/>
+              </a:ext>
+            </a:extLst>
+          </p:cNvPr>
+          <p:cNvSpPr>
+            <a:spLocks noGrp="1"/>
+          </p:cNvSpPr>
+          <p:nvPr>
+            <p:ph type="ctrTitle"/>
+          </p:nvPr>
+        </p:nvSpPr>
+        <p:spPr>
+          <a:xfrm>
+            <a:off x="1507067" y="345351"/>
+            <a:ext cx="7766936" cy="970133"/>
+          </a:xfrm>
+        </p:spPr>
+        <p:txBody>
+          <a:bodyPr/>
+          <a:lstStyle/>
+          <a:p>
+            <a:pPr algn="l"/>
+            <a:r>
+              <a:rPr lang="en-US" dirty="0">
+                <a:solidFill>
+                  <a:schemeClr val="tx1">
+                    <a:lumMod val="85000"/>
+                    <a:lumOff val="15000"/>
+                  </a:schemeClr>
+                </a:solidFill>
+                <a:latin typeface="Segoe UI" panose="020B0502040204020203" pitchFamily="34" charset="0"/>
+                <a:cs typeface="Segoe UI" panose="020B0502040204020203" pitchFamily="34" charset="0"/>
+              </a:rPr>
+              <a:t>JS| </a:t>
+            </a:r>
+            <a:r>
+              <a:rPr lang="en-US" sz="3200" b="1" dirty="0">
+                <a:solidFill>
+                  <a:schemeClr val="tx1">
+                    <a:lumMod val="85000"/>
+                    <a:lumOff val="15000"/>
+                  </a:schemeClr>
+                </a:solidFill>
+                <a:latin typeface="Segoe UI" panose="020B0502040204020203" pitchFamily="34" charset="0"/>
+                <a:cs typeface="Segoe UI" panose="020B0502040204020203" pitchFamily="34" charset="0"/>
+              </a:rPr>
+              <a:t>Functions Declaration</a:t>
+            </a:r>
+            <a:endParaRPr lang="en-US" b="1" dirty="0">
+              <a:solidFill>
+                <a:schemeClr val="tx1">
+                  <a:lumMod val="85000"/>
+                  <a:lumOff val="15000"/>
+                </a:schemeClr>
+              </a:solidFill>
+              <a:latin typeface="Segoe UI" panose="020B0502040204020203" pitchFamily="34" charset="0"/>
+              <a:cs typeface="Segoe UI" panose="020B0502040204020203" pitchFamily="34" charset="0"/>
+            </a:endParaRPr>
+          </a:p>
+        </p:txBody>
+      </p:sp>
+      <p:pic>
+        <p:nvPicPr>
+          <p:cNvPr id="7" name="Picture 6">
+            <a:extLst>
+              <a:ext uri="{FF2B5EF4-FFF2-40B4-BE49-F238E27FC236}">
+                <a16:creationId xmlns:a16="http://schemas.microsoft.com/office/drawing/2014/main" id="{0DF3C225-5C88-461B-8E3B-80625D0C8597}"/>
+              </a:ext>
+            </a:extLst>
+          </p:cNvPr>
+          <p:cNvPicPr>
+            <a:picLocks noChangeAspect="1"/>
+          </p:cNvPicPr>
+          <p:nvPr/>
+        </p:nvPicPr>
+        <p:blipFill>
+          <a:blip r:embed="rId3"/>
+          <a:stretch>
+            <a:fillRect/>
+          </a:stretch>
+        </p:blipFill>
+        <p:spPr>
+          <a:xfrm>
+            <a:off x="541537" y="2489985"/>
+            <a:ext cx="1079515" cy="1079515"/>
+          </a:xfrm>
+          <a:prstGeom prst="rect">
+            <a:avLst/>
+          </a:prstGeom>
+        </p:spPr>
+      </p:pic>
+    </p:spTree>
+    <p:extLst>
+      <p:ext uri="{BB962C8B-B14F-4D97-AF65-F5344CB8AC3E}">
+        <p14:creationId xmlns:p14="http://schemas.microsoft.com/office/powerpoint/2010/main" val="1827091788"/>
+      </p:ext>
+    </p:extLst>
+  </p:cSld>
+  <p:clrMapOvr>
+    <a:masterClrMapping/>
+  </p:clrMapOvr>
+</p:sld>
+</file>
+
+<file path=ppt/slides/slide50.xml><?xml version="1.0" encoding="utf-8"?>
+<p:sld xmlns:a="http://schemas.openxmlformats.org/drawingml/2006/main" xmlns:r="http://schemas.openxmlformats.org/officeDocument/2006/relationships" xmlns:p="http://schemas.openxmlformats.org/presentationml/2006/main">
+  <p:cSld>
+    <p:spTree>
+      <p:nvGrpSpPr>
+        <p:cNvPr id="1" name=""/>
+        <p:cNvGrpSpPr/>
+        <p:nvPr/>
+      </p:nvGrpSpPr>
+      <p:grpSpPr>
+        <a:xfrm>
+          <a:off x="0" y="0"/>
+          <a:ext cx="0" cy="0"/>
+          <a:chOff x="0" y="0"/>
+          <a:chExt cx="0" cy="0"/>
+        </a:xfrm>
+      </p:grpSpPr>
+      <p:sp>
+        <p:nvSpPr>
+          <p:cNvPr id="2" name="Title 1">
+            <a:extLst>
+              <a:ext uri="{FF2B5EF4-FFF2-40B4-BE49-F238E27FC236}">
+                <a16:creationId xmlns:a16="http://schemas.microsoft.com/office/drawing/2014/main" id="{2D4E4121-CDC8-41BA-846E-58655BA90FCF}"/>
+              </a:ext>
+            </a:extLst>
+          </p:cNvPr>
+          <p:cNvSpPr>
+            <a:spLocks noGrp="1"/>
+          </p:cNvSpPr>
+          <p:nvPr>
+            <p:ph type="ctrTitle"/>
+          </p:nvPr>
+        </p:nvSpPr>
+        <p:spPr>
+          <a:xfrm>
+            <a:off x="1507067" y="345351"/>
+            <a:ext cx="7766936" cy="970133"/>
+          </a:xfrm>
+        </p:spPr>
+        <p:txBody>
+          <a:bodyPr/>
+          <a:lstStyle/>
+          <a:p>
+            <a:pPr algn="l"/>
+            <a:r>
+              <a:rPr lang="en-US" dirty="0">
+                <a:solidFill>
+                  <a:schemeClr val="tx1">
+                    <a:lumMod val="85000"/>
+                    <a:lumOff val="15000"/>
+                  </a:schemeClr>
+                </a:solidFill>
+                <a:latin typeface="Segoe UI" panose="020B0502040204020203" pitchFamily="34" charset="0"/>
+                <a:cs typeface="Segoe UI" panose="020B0502040204020203" pitchFamily="34" charset="0"/>
+              </a:rPr>
+              <a:t>JS| </a:t>
+            </a:r>
+            <a:r>
+              <a:rPr lang="en-US" sz="3200" b="1" dirty="0">
+                <a:solidFill>
+                  <a:schemeClr val="tx1">
+                    <a:lumMod val="85000"/>
+                    <a:lumOff val="15000"/>
+                  </a:schemeClr>
+                </a:solidFill>
+                <a:latin typeface="Segoe UI" panose="020B0502040204020203" pitchFamily="34" charset="0"/>
+                <a:cs typeface="Segoe UI" panose="020B0502040204020203" pitchFamily="34" charset="0"/>
+              </a:rPr>
+              <a:t>Functions Methos - Apply</a:t>
+            </a:r>
+            <a:endParaRPr lang="en-US" b="1" dirty="0">
+              <a:solidFill>
+                <a:schemeClr val="tx1">
+                  <a:lumMod val="85000"/>
+                  <a:lumOff val="15000"/>
+                </a:schemeClr>
+              </a:solidFill>
+              <a:latin typeface="Segoe UI" panose="020B0502040204020203" pitchFamily="34" charset="0"/>
+              <a:cs typeface="Segoe UI" panose="020B0502040204020203" pitchFamily="34" charset="0"/>
+            </a:endParaRPr>
+          </a:p>
+        </p:txBody>
+      </p:sp>
+      <p:sp>
+        <p:nvSpPr>
+          <p:cNvPr id="6" name="TextBox 5">
+            <a:extLst>
+              <a:ext uri="{FF2B5EF4-FFF2-40B4-BE49-F238E27FC236}">
+                <a16:creationId xmlns:a16="http://schemas.microsoft.com/office/drawing/2014/main" id="{2B7B81F7-6A0C-41F3-8DFF-FCF27F70557B}"/>
+              </a:ext>
+            </a:extLst>
+          </p:cNvPr>
+          <p:cNvSpPr txBox="1"/>
+          <p:nvPr/>
+        </p:nvSpPr>
+        <p:spPr>
+          <a:xfrm>
+            <a:off x="1507066" y="1643512"/>
+            <a:ext cx="9616652" cy="1569660"/>
+          </a:xfrm>
+          <a:prstGeom prst="rect">
+            <a:avLst/>
+          </a:prstGeom>
+          <a:noFill/>
+        </p:spPr>
+        <p:txBody>
+          <a:bodyPr wrap="square">
+            <a:spAutoFit/>
+          </a:bodyPr>
+          <a:lstStyle/>
+          <a:p>
+            <a:pPr algn="just"/>
+            <a:r>
+              <a:rPr lang="en-US" sz="1600" dirty="0">
+                <a:latin typeface="Segoe UI" panose="020B0502040204020203" pitchFamily="34" charset="0"/>
+                <a:cs typeface="Segoe UI" panose="020B0502040204020203" pitchFamily="34" charset="0"/>
+              </a:rPr>
+              <a:t>Allow you to </a:t>
+            </a:r>
+            <a:r>
+              <a:rPr lang="en-US" sz="1600" b="1" dirty="0">
+                <a:latin typeface="Segoe UI" panose="020B0502040204020203" pitchFamily="34" charset="0"/>
+                <a:cs typeface="Segoe UI" panose="020B0502040204020203" pitchFamily="34" charset="0"/>
+              </a:rPr>
+              <a:t>indirectly invoke </a:t>
+            </a:r>
+            <a:r>
+              <a:rPr lang="en-US" sz="1600" dirty="0">
+                <a:latin typeface="Segoe UI" panose="020B0502040204020203" pitchFamily="34" charset="0"/>
+                <a:cs typeface="Segoe UI" panose="020B0502040204020203" pitchFamily="34" charset="0"/>
+              </a:rPr>
+              <a:t>a function as if it were a method of some other object. </a:t>
+            </a:r>
+          </a:p>
+          <a:p>
+            <a:pPr algn="just"/>
+            <a:endParaRPr lang="en-US" sz="1600" dirty="0">
+              <a:latin typeface="Segoe UI" panose="020B0502040204020203" pitchFamily="34" charset="0"/>
+              <a:cs typeface="Segoe UI" panose="020B0502040204020203" pitchFamily="34" charset="0"/>
+            </a:endParaRPr>
+          </a:p>
+          <a:p>
+            <a:pPr algn="just"/>
+            <a:r>
+              <a:rPr lang="en-US" sz="1600" dirty="0">
+                <a:latin typeface="Segoe UI" panose="020B0502040204020203" pitchFamily="34" charset="0"/>
+                <a:cs typeface="Segoe UI" panose="020B0502040204020203" pitchFamily="34" charset="0"/>
+              </a:rPr>
+              <a:t>The </a:t>
+            </a:r>
+            <a:r>
+              <a:rPr lang="en-US" sz="1600" b="1" dirty="0">
+                <a:latin typeface="Segoe UI" panose="020B0502040204020203" pitchFamily="34" charset="0"/>
+                <a:cs typeface="Segoe UI" panose="020B0502040204020203" pitchFamily="34" charset="0"/>
+              </a:rPr>
+              <a:t>first argument </a:t>
+            </a:r>
+            <a:r>
+              <a:rPr lang="en-US" sz="1600" dirty="0">
+                <a:latin typeface="Segoe UI" panose="020B0502040204020203" pitchFamily="34" charset="0"/>
+                <a:cs typeface="Segoe UI" panose="020B0502040204020203" pitchFamily="34" charset="0"/>
+              </a:rPr>
+              <a:t>is the object on which the function is to be invoked; this argument is the </a:t>
+            </a:r>
+            <a:r>
+              <a:rPr lang="en-US" sz="1600" b="1" dirty="0">
+                <a:latin typeface="Segoe UI" panose="020B0502040204020203" pitchFamily="34" charset="0"/>
+                <a:cs typeface="Segoe UI" panose="020B0502040204020203" pitchFamily="34" charset="0"/>
+              </a:rPr>
+              <a:t>invocation context </a:t>
+            </a:r>
+            <a:r>
+              <a:rPr lang="en-US" sz="1600" dirty="0">
+                <a:latin typeface="Segoe UI" panose="020B0502040204020203" pitchFamily="34" charset="0"/>
+                <a:cs typeface="Segoe UI" panose="020B0502040204020203" pitchFamily="34" charset="0"/>
+              </a:rPr>
+              <a:t>and becomes the value of the </a:t>
+            </a:r>
+            <a:r>
+              <a:rPr lang="en-US" sz="1600" b="1" dirty="0">
+                <a:latin typeface="Segoe UI" panose="020B0502040204020203" pitchFamily="34" charset="0"/>
+                <a:cs typeface="Segoe UI" panose="020B0502040204020203" pitchFamily="34" charset="0"/>
+              </a:rPr>
+              <a:t>this </a:t>
+            </a:r>
+            <a:r>
+              <a:rPr lang="en-US" sz="1600" dirty="0">
+                <a:latin typeface="Segoe UI" panose="020B0502040204020203" pitchFamily="34" charset="0"/>
+                <a:cs typeface="Segoe UI" panose="020B0502040204020203" pitchFamily="34" charset="0"/>
+              </a:rPr>
+              <a:t>keyword within the body of the function.</a:t>
+            </a:r>
+          </a:p>
+          <a:p>
+            <a:pPr algn="just"/>
+            <a:endParaRPr lang="en-US" sz="1600" dirty="0">
+              <a:latin typeface="Segoe UI" panose="020B0502040204020203" pitchFamily="34" charset="0"/>
+              <a:cs typeface="Segoe UI" panose="020B0502040204020203" pitchFamily="34" charset="0"/>
+            </a:endParaRPr>
+          </a:p>
+          <a:p>
+            <a:r>
+              <a:rPr lang="en-US" sz="1600" dirty="0">
+                <a:latin typeface="Segoe UI" panose="020B0502040204020203" pitchFamily="34" charset="0"/>
+                <a:cs typeface="Segoe UI" panose="020B0502040204020203" pitchFamily="34" charset="0"/>
+              </a:rPr>
+              <a:t>The apply() method, except as </a:t>
+            </a:r>
+            <a:r>
+              <a:rPr lang="en-US" sz="1600" b="1" dirty="0">
+                <a:latin typeface="Segoe UI" panose="020B0502040204020203" pitchFamily="34" charset="0"/>
+                <a:cs typeface="Segoe UI" panose="020B0502040204020203" pitchFamily="34" charset="0"/>
+              </a:rPr>
+              <a:t>second argument</a:t>
+            </a:r>
+            <a:r>
+              <a:rPr lang="en-US" sz="1600" dirty="0">
+                <a:latin typeface="Segoe UI" panose="020B0502040204020203" pitchFamily="34" charset="0"/>
+                <a:cs typeface="Segoe UI" panose="020B0502040204020203" pitchFamily="34" charset="0"/>
+              </a:rPr>
+              <a:t> to be passed to the function are specified as an </a:t>
+            </a:r>
+            <a:r>
+              <a:rPr lang="en-US" sz="1600" b="1" dirty="0">
+                <a:latin typeface="Segoe UI" panose="020B0502040204020203" pitchFamily="34" charset="0"/>
+                <a:cs typeface="Segoe UI" panose="020B0502040204020203" pitchFamily="34" charset="0"/>
+              </a:rPr>
+              <a:t>array</a:t>
+            </a:r>
+            <a:r>
+              <a:rPr lang="en-US" sz="1600" dirty="0">
+                <a:latin typeface="Segoe UI" panose="020B0502040204020203" pitchFamily="34" charset="0"/>
+                <a:cs typeface="Segoe UI" panose="020B0502040204020203" pitchFamily="34" charset="0"/>
+              </a:rPr>
+              <a:t> </a:t>
+            </a:r>
+          </a:p>
+        </p:txBody>
+      </p:sp>
+      <p:sp>
+        <p:nvSpPr>
+          <p:cNvPr id="8" name="TextBox 7">
+            <a:extLst>
+              <a:ext uri="{FF2B5EF4-FFF2-40B4-BE49-F238E27FC236}">
+                <a16:creationId xmlns:a16="http://schemas.microsoft.com/office/drawing/2014/main" id="{49809AD7-C229-4F47-AD12-F19C8AAF69B2}"/>
+              </a:ext>
+            </a:extLst>
+          </p:cNvPr>
+          <p:cNvSpPr txBox="1"/>
+          <p:nvPr/>
+        </p:nvSpPr>
+        <p:spPr>
+          <a:xfrm>
+            <a:off x="1507065" y="3541200"/>
+            <a:ext cx="2026247" cy="369332"/>
+          </a:xfrm>
+          <a:prstGeom prst="rect">
+            <a:avLst/>
+          </a:prstGeom>
+          <a:noFill/>
+          <a:ln w="57150">
+            <a:solidFill>
+              <a:srgbClr val="0070C0"/>
+            </a:solidFill>
+          </a:ln>
+        </p:spPr>
+        <p:txBody>
+          <a:bodyPr wrap="square">
+            <a:spAutoFit/>
+          </a:bodyPr>
+          <a:lstStyle/>
+          <a:p>
+            <a:pPr algn="just"/>
+            <a:r>
+              <a:rPr lang="en-US" sz="1800" dirty="0" err="1">
+                <a:latin typeface="Segoe UI" panose="020B0502040204020203" pitchFamily="34" charset="0"/>
+                <a:cs typeface="Segoe UI" panose="020B0502040204020203" pitchFamily="34" charset="0"/>
+              </a:rPr>
+              <a:t>f.apply</a:t>
+            </a:r>
+            <a:r>
+              <a:rPr lang="en-US" sz="1800" dirty="0">
+                <a:latin typeface="Segoe UI" panose="020B0502040204020203" pitchFamily="34" charset="0"/>
+                <a:cs typeface="Segoe UI" panose="020B0502040204020203" pitchFamily="34" charset="0"/>
+              </a:rPr>
+              <a:t>(o, [1,2]);</a:t>
+            </a:r>
+          </a:p>
+        </p:txBody>
+      </p:sp>
+      <p:sp>
+        <p:nvSpPr>
+          <p:cNvPr id="9" name="TextBox 8">
+            <a:extLst>
+              <a:ext uri="{FF2B5EF4-FFF2-40B4-BE49-F238E27FC236}">
+                <a16:creationId xmlns:a16="http://schemas.microsoft.com/office/drawing/2014/main" id="{B1761187-2E99-4C92-94CE-78AA9C8978DB}"/>
+              </a:ext>
+            </a:extLst>
+          </p:cNvPr>
+          <p:cNvSpPr txBox="1"/>
+          <p:nvPr/>
+        </p:nvSpPr>
+        <p:spPr>
+          <a:xfrm>
+            <a:off x="1507065" y="4238560"/>
+            <a:ext cx="9616651" cy="338554"/>
+          </a:xfrm>
+          <a:prstGeom prst="rect">
+            <a:avLst/>
+          </a:prstGeom>
+          <a:solidFill>
+            <a:srgbClr val="FFE7B7"/>
+          </a:solidFill>
+          <a:ln w="57150">
+            <a:solidFill>
+              <a:srgbClr val="FFC000"/>
+            </a:solidFill>
+          </a:ln>
+        </p:spPr>
+        <p:txBody>
+          <a:bodyPr wrap="square">
+            <a:spAutoFit/>
+          </a:bodyPr>
+          <a:lstStyle/>
+          <a:p>
+            <a:r>
+              <a:rPr lang="en-US" sz="1600" dirty="0">
+                <a:latin typeface="Segoe UI" panose="020B0502040204020203" pitchFamily="34" charset="0"/>
+                <a:cs typeface="Segoe UI" panose="020B0502040204020203" pitchFamily="34" charset="0"/>
+              </a:rPr>
+              <a:t>Remember that arrow functions inherit the this value of the context where they are defined.</a:t>
+            </a:r>
+          </a:p>
+        </p:txBody>
+      </p:sp>
+    </p:spTree>
+    <p:extLst>
+      <p:ext uri="{BB962C8B-B14F-4D97-AF65-F5344CB8AC3E}">
+        <p14:creationId xmlns:p14="http://schemas.microsoft.com/office/powerpoint/2010/main" val="4177312885"/>
+      </p:ext>
+    </p:extLst>
+  </p:cSld>
+  <p:clrMapOvr>
+    <a:masterClrMapping/>
+  </p:clrMapOvr>
+</p:sld>
+</file>
+
+<file path=ppt/slides/slide51.xml><?xml version="1.0" encoding="utf-8"?>
+<p:sld xmlns:a="http://schemas.openxmlformats.org/drawingml/2006/main" xmlns:r="http://schemas.openxmlformats.org/officeDocument/2006/relationships" xmlns:p="http://schemas.openxmlformats.org/presentationml/2006/main">
+  <p:cSld>
+    <p:spTree>
+      <p:nvGrpSpPr>
+        <p:cNvPr id="1" name=""/>
+        <p:cNvGrpSpPr/>
+        <p:nvPr/>
+      </p:nvGrpSpPr>
+      <p:grpSpPr>
+        <a:xfrm>
+          <a:off x="0" y="0"/>
+          <a:ext cx="0" cy="0"/>
+          <a:chOff x="0" y="0"/>
+          <a:chExt cx="0" cy="0"/>
+        </a:xfrm>
+      </p:grpSpPr>
+      <p:sp>
+        <p:nvSpPr>
+          <p:cNvPr id="2" name="Title 1">
+            <a:extLst>
+              <a:ext uri="{FF2B5EF4-FFF2-40B4-BE49-F238E27FC236}">
+                <a16:creationId xmlns:a16="http://schemas.microsoft.com/office/drawing/2014/main" id="{2D4E4121-CDC8-41BA-846E-58655BA90FCF}"/>
+              </a:ext>
+            </a:extLst>
+          </p:cNvPr>
+          <p:cNvSpPr>
+            <a:spLocks noGrp="1"/>
+          </p:cNvSpPr>
+          <p:nvPr>
+            <p:ph type="ctrTitle"/>
+          </p:nvPr>
+        </p:nvSpPr>
+        <p:spPr>
+          <a:xfrm>
+            <a:off x="1507067" y="345351"/>
+            <a:ext cx="7766936" cy="970133"/>
+          </a:xfrm>
+        </p:spPr>
+        <p:txBody>
+          <a:bodyPr/>
+          <a:lstStyle/>
+          <a:p>
+            <a:pPr algn="l"/>
+            <a:r>
+              <a:rPr lang="en-US" dirty="0">
+                <a:solidFill>
+                  <a:schemeClr val="tx1">
+                    <a:lumMod val="85000"/>
+                    <a:lumOff val="15000"/>
+                  </a:schemeClr>
+                </a:solidFill>
+                <a:latin typeface="Segoe UI" panose="020B0502040204020203" pitchFamily="34" charset="0"/>
+                <a:cs typeface="Segoe UI" panose="020B0502040204020203" pitchFamily="34" charset="0"/>
+              </a:rPr>
+              <a:t>JS| </a:t>
+            </a:r>
+            <a:r>
+              <a:rPr lang="en-US" sz="3200" b="1" dirty="0">
+                <a:solidFill>
+                  <a:schemeClr val="tx1">
+                    <a:lumMod val="85000"/>
+                    <a:lumOff val="15000"/>
+                  </a:schemeClr>
+                </a:solidFill>
+                <a:latin typeface="Segoe UI" panose="020B0502040204020203" pitchFamily="34" charset="0"/>
+                <a:cs typeface="Segoe UI" panose="020B0502040204020203" pitchFamily="34" charset="0"/>
+              </a:rPr>
+              <a:t>Functions Methos - Bind</a:t>
+            </a:r>
+            <a:endParaRPr lang="en-US" b="1" dirty="0">
+              <a:solidFill>
+                <a:schemeClr val="tx1">
+                  <a:lumMod val="85000"/>
+                  <a:lumOff val="15000"/>
+                </a:schemeClr>
+              </a:solidFill>
+              <a:latin typeface="Segoe UI" panose="020B0502040204020203" pitchFamily="34" charset="0"/>
+              <a:cs typeface="Segoe UI" panose="020B0502040204020203" pitchFamily="34" charset="0"/>
+            </a:endParaRPr>
+          </a:p>
+        </p:txBody>
+      </p:sp>
+      <p:sp>
+        <p:nvSpPr>
+          <p:cNvPr id="6" name="TextBox 5">
+            <a:extLst>
+              <a:ext uri="{FF2B5EF4-FFF2-40B4-BE49-F238E27FC236}">
+                <a16:creationId xmlns:a16="http://schemas.microsoft.com/office/drawing/2014/main" id="{2B7B81F7-6A0C-41F3-8DFF-FCF27F70557B}"/>
+              </a:ext>
+            </a:extLst>
+          </p:cNvPr>
+          <p:cNvSpPr txBox="1"/>
+          <p:nvPr/>
+        </p:nvSpPr>
+        <p:spPr>
+          <a:xfrm>
+            <a:off x="1507066" y="1643512"/>
+            <a:ext cx="9616652" cy="1569660"/>
+          </a:xfrm>
+          <a:prstGeom prst="rect">
+            <a:avLst/>
+          </a:prstGeom>
+          <a:noFill/>
+        </p:spPr>
+        <p:txBody>
+          <a:bodyPr wrap="square">
+            <a:spAutoFit/>
+          </a:bodyPr>
+          <a:lstStyle/>
+          <a:p>
+            <a:r>
+              <a:rPr lang="en-US" sz="1600" dirty="0">
+                <a:latin typeface="Segoe UI" panose="020B0502040204020203" pitchFamily="34" charset="0"/>
+                <a:cs typeface="Segoe UI" panose="020B0502040204020203" pitchFamily="34" charset="0"/>
+              </a:rPr>
+              <a:t>The primary purpose of bind() is to </a:t>
+            </a:r>
+            <a:r>
+              <a:rPr lang="en-US" sz="1600" b="1" dirty="0">
+                <a:latin typeface="Segoe UI" panose="020B0502040204020203" pitchFamily="34" charset="0"/>
+                <a:cs typeface="Segoe UI" panose="020B0502040204020203" pitchFamily="34" charset="0"/>
+              </a:rPr>
+              <a:t>bind</a:t>
+            </a:r>
+            <a:r>
+              <a:rPr lang="en-US" sz="1600" dirty="0">
+                <a:latin typeface="Segoe UI" panose="020B0502040204020203" pitchFamily="34" charset="0"/>
+                <a:cs typeface="Segoe UI" panose="020B0502040204020203" pitchFamily="34" charset="0"/>
+              </a:rPr>
+              <a:t> a </a:t>
+            </a:r>
+            <a:r>
+              <a:rPr lang="en-US" sz="1600" b="1" dirty="0">
+                <a:latin typeface="Segoe UI" panose="020B0502040204020203" pitchFamily="34" charset="0"/>
+                <a:cs typeface="Segoe UI" panose="020B0502040204020203" pitchFamily="34" charset="0"/>
+              </a:rPr>
+              <a:t>function</a:t>
+            </a:r>
+            <a:r>
+              <a:rPr lang="en-US" sz="1600" dirty="0">
+                <a:latin typeface="Segoe UI" panose="020B0502040204020203" pitchFamily="34" charset="0"/>
+                <a:cs typeface="Segoe UI" panose="020B0502040204020203" pitchFamily="34" charset="0"/>
+              </a:rPr>
+              <a:t> to an </a:t>
+            </a:r>
+            <a:r>
+              <a:rPr lang="en-US" sz="1600" b="1" dirty="0">
+                <a:latin typeface="Segoe UI" panose="020B0502040204020203" pitchFamily="34" charset="0"/>
+                <a:cs typeface="Segoe UI" panose="020B0502040204020203" pitchFamily="34" charset="0"/>
+              </a:rPr>
+              <a:t>object</a:t>
+            </a:r>
+            <a:r>
+              <a:rPr lang="en-US" sz="1600" dirty="0">
+                <a:latin typeface="Segoe UI" panose="020B0502040204020203" pitchFamily="34" charset="0"/>
+                <a:cs typeface="Segoe UI" panose="020B0502040204020203" pitchFamily="34" charset="0"/>
+              </a:rPr>
+              <a:t>. </a:t>
+            </a:r>
+          </a:p>
+          <a:p>
+            <a:endParaRPr lang="en-US" sz="1600" dirty="0">
+              <a:latin typeface="Segoe UI" panose="020B0502040204020203" pitchFamily="34" charset="0"/>
+              <a:cs typeface="Segoe UI" panose="020B0502040204020203" pitchFamily="34" charset="0"/>
+            </a:endParaRPr>
+          </a:p>
+          <a:p>
+            <a:r>
+              <a:rPr lang="en-US" sz="1600" dirty="0">
+                <a:latin typeface="Segoe UI" panose="020B0502040204020203" pitchFamily="34" charset="0"/>
+                <a:cs typeface="Segoe UI" panose="020B0502040204020203" pitchFamily="34" charset="0"/>
+              </a:rPr>
+              <a:t>When you </a:t>
+            </a:r>
+            <a:r>
+              <a:rPr lang="en-US" sz="1600" b="1" dirty="0">
+                <a:latin typeface="Segoe UI" panose="020B0502040204020203" pitchFamily="34" charset="0"/>
+                <a:cs typeface="Segoe UI" panose="020B0502040204020203" pitchFamily="34" charset="0"/>
+              </a:rPr>
+              <a:t>invoke</a:t>
+            </a:r>
+            <a:r>
+              <a:rPr lang="en-US" sz="1600" dirty="0">
+                <a:latin typeface="Segoe UI" panose="020B0502040204020203" pitchFamily="34" charset="0"/>
+                <a:cs typeface="Segoe UI" panose="020B0502040204020203" pitchFamily="34" charset="0"/>
+              </a:rPr>
+              <a:t> the </a:t>
+            </a:r>
+            <a:r>
+              <a:rPr lang="en-US" sz="1600" b="1" dirty="0">
+                <a:latin typeface="Segoe UI" panose="020B0502040204020203" pitchFamily="34" charset="0"/>
+                <a:cs typeface="Segoe UI" panose="020B0502040204020203" pitchFamily="34" charset="0"/>
+              </a:rPr>
+              <a:t>bind</a:t>
+            </a:r>
+            <a:r>
+              <a:rPr lang="en-US" sz="1600" dirty="0">
+                <a:latin typeface="Segoe UI" panose="020B0502040204020203" pitchFamily="34" charset="0"/>
+                <a:cs typeface="Segoe UI" panose="020B0502040204020203" pitchFamily="34" charset="0"/>
+              </a:rPr>
+              <a:t>() method on a </a:t>
+            </a:r>
+            <a:r>
+              <a:rPr lang="en-US" sz="1600" b="1" dirty="0">
+                <a:latin typeface="Segoe UI" panose="020B0502040204020203" pitchFamily="34" charset="0"/>
+                <a:cs typeface="Segoe UI" panose="020B0502040204020203" pitchFamily="34" charset="0"/>
+              </a:rPr>
+              <a:t>function</a:t>
+            </a:r>
+            <a:r>
+              <a:rPr lang="en-US" sz="1600" dirty="0">
+                <a:latin typeface="Segoe UI" panose="020B0502040204020203" pitchFamily="34" charset="0"/>
+                <a:cs typeface="Segoe UI" panose="020B0502040204020203" pitchFamily="34" charset="0"/>
+              </a:rPr>
+              <a:t> f and pass an </a:t>
+            </a:r>
+            <a:r>
+              <a:rPr lang="en-US" sz="1600" b="1" dirty="0">
+                <a:latin typeface="Segoe UI" panose="020B0502040204020203" pitchFamily="34" charset="0"/>
+                <a:cs typeface="Segoe UI" panose="020B0502040204020203" pitchFamily="34" charset="0"/>
+              </a:rPr>
+              <a:t>object</a:t>
+            </a:r>
+            <a:r>
+              <a:rPr lang="en-US" sz="1600" dirty="0">
+                <a:latin typeface="Segoe UI" panose="020B0502040204020203" pitchFamily="34" charset="0"/>
+                <a:cs typeface="Segoe UI" panose="020B0502040204020203" pitchFamily="34" charset="0"/>
+              </a:rPr>
+              <a:t> o, the method returns a new function. </a:t>
+            </a:r>
+          </a:p>
+          <a:p>
+            <a:endParaRPr lang="en-US" sz="1600" dirty="0">
+              <a:latin typeface="Segoe UI" panose="020B0502040204020203" pitchFamily="34" charset="0"/>
+              <a:cs typeface="Segoe UI" panose="020B0502040204020203" pitchFamily="34" charset="0"/>
+            </a:endParaRPr>
+          </a:p>
+          <a:p>
+            <a:r>
+              <a:rPr lang="en-US" sz="1600" dirty="0">
+                <a:latin typeface="Segoe UI" panose="020B0502040204020203" pitchFamily="34" charset="0"/>
+                <a:cs typeface="Segoe UI" panose="020B0502040204020203" pitchFamily="34" charset="0"/>
+              </a:rPr>
+              <a:t>Invoking the new function (as a function) </a:t>
+            </a:r>
+            <a:r>
+              <a:rPr lang="en-US" sz="1600" b="1" dirty="0">
+                <a:latin typeface="Segoe UI" panose="020B0502040204020203" pitchFamily="34" charset="0"/>
+                <a:cs typeface="Segoe UI" panose="020B0502040204020203" pitchFamily="34" charset="0"/>
+              </a:rPr>
+              <a:t>invokes</a:t>
+            </a:r>
+            <a:r>
+              <a:rPr lang="en-US" sz="1600" dirty="0">
+                <a:latin typeface="Segoe UI" panose="020B0502040204020203" pitchFamily="34" charset="0"/>
+                <a:cs typeface="Segoe UI" panose="020B0502040204020203" pitchFamily="34" charset="0"/>
+              </a:rPr>
+              <a:t> the </a:t>
+            </a:r>
+            <a:r>
+              <a:rPr lang="en-US" sz="1600" b="1" dirty="0">
+                <a:latin typeface="Segoe UI" panose="020B0502040204020203" pitchFamily="34" charset="0"/>
+                <a:cs typeface="Segoe UI" panose="020B0502040204020203" pitchFamily="34" charset="0"/>
+              </a:rPr>
+              <a:t>original function </a:t>
+            </a:r>
+            <a:r>
+              <a:rPr lang="en-US" sz="1600" dirty="0">
+                <a:latin typeface="Segoe UI" panose="020B0502040204020203" pitchFamily="34" charset="0"/>
+                <a:cs typeface="Segoe UI" panose="020B0502040204020203" pitchFamily="34" charset="0"/>
+              </a:rPr>
+              <a:t>f as a </a:t>
+            </a:r>
+            <a:r>
+              <a:rPr lang="en-US" sz="1600" b="1" dirty="0">
+                <a:latin typeface="Segoe UI" panose="020B0502040204020203" pitchFamily="34" charset="0"/>
+                <a:cs typeface="Segoe UI" panose="020B0502040204020203" pitchFamily="34" charset="0"/>
+              </a:rPr>
+              <a:t>method</a:t>
+            </a:r>
+            <a:r>
+              <a:rPr lang="en-US" sz="1600" dirty="0">
+                <a:latin typeface="Segoe UI" panose="020B0502040204020203" pitchFamily="34" charset="0"/>
+                <a:cs typeface="Segoe UI" panose="020B0502040204020203" pitchFamily="34" charset="0"/>
+              </a:rPr>
+              <a:t> of </a:t>
+            </a:r>
+            <a:r>
+              <a:rPr lang="en-US" sz="1600" b="1" dirty="0">
+                <a:latin typeface="Segoe UI" panose="020B0502040204020203" pitchFamily="34" charset="0"/>
+                <a:cs typeface="Segoe UI" panose="020B0502040204020203" pitchFamily="34" charset="0"/>
+              </a:rPr>
+              <a:t>o</a:t>
+            </a:r>
+            <a:r>
+              <a:rPr lang="en-US" sz="1600" dirty="0">
+                <a:latin typeface="Segoe UI" panose="020B0502040204020203" pitchFamily="34" charset="0"/>
+                <a:cs typeface="Segoe UI" panose="020B0502040204020203" pitchFamily="34" charset="0"/>
+              </a:rPr>
+              <a:t>.</a:t>
+            </a:r>
+          </a:p>
+        </p:txBody>
+      </p:sp>
+      <p:sp>
+        <p:nvSpPr>
+          <p:cNvPr id="8" name="TextBox 7">
+            <a:extLst>
+              <a:ext uri="{FF2B5EF4-FFF2-40B4-BE49-F238E27FC236}">
+                <a16:creationId xmlns:a16="http://schemas.microsoft.com/office/drawing/2014/main" id="{49809AD7-C229-4F47-AD12-F19C8AAF69B2}"/>
+              </a:ext>
+            </a:extLst>
+          </p:cNvPr>
+          <p:cNvSpPr txBox="1"/>
+          <p:nvPr/>
+        </p:nvSpPr>
+        <p:spPr>
+          <a:xfrm>
+            <a:off x="1507065" y="3541200"/>
+            <a:ext cx="2629929" cy="369332"/>
+          </a:xfrm>
+          <a:prstGeom prst="rect">
+            <a:avLst/>
+          </a:prstGeom>
+          <a:noFill/>
+          <a:ln w="57150">
+            <a:solidFill>
+              <a:srgbClr val="0070C0"/>
+            </a:solidFill>
+          </a:ln>
+        </p:spPr>
+        <p:txBody>
+          <a:bodyPr wrap="square">
+            <a:spAutoFit/>
+          </a:bodyPr>
+          <a:lstStyle/>
+          <a:p>
+            <a:pPr algn="just"/>
+            <a:r>
+              <a:rPr lang="en-US" sz="1800" dirty="0">
+                <a:latin typeface="Segoe UI" panose="020B0502040204020203" pitchFamily="34" charset="0"/>
+                <a:cs typeface="Segoe UI" panose="020B0502040204020203" pitchFamily="34" charset="0"/>
+              </a:rPr>
+              <a:t>let g = </a:t>
+            </a:r>
+            <a:r>
+              <a:rPr lang="en-US" sz="1800" dirty="0" err="1">
+                <a:latin typeface="Segoe UI" panose="020B0502040204020203" pitchFamily="34" charset="0"/>
+                <a:cs typeface="Segoe UI" panose="020B0502040204020203" pitchFamily="34" charset="0"/>
+              </a:rPr>
+              <a:t>f.bind</a:t>
+            </a:r>
+            <a:r>
+              <a:rPr lang="en-US" sz="1800" dirty="0">
+                <a:latin typeface="Segoe UI" panose="020B0502040204020203" pitchFamily="34" charset="0"/>
+                <a:cs typeface="Segoe UI" panose="020B0502040204020203" pitchFamily="34" charset="0"/>
+              </a:rPr>
+              <a:t>({ x: 1}, 2);</a:t>
+            </a:r>
+          </a:p>
+        </p:txBody>
+      </p:sp>
+      <p:sp>
+        <p:nvSpPr>
+          <p:cNvPr id="7" name="TextBox 6">
+            <a:extLst>
+              <a:ext uri="{FF2B5EF4-FFF2-40B4-BE49-F238E27FC236}">
+                <a16:creationId xmlns:a16="http://schemas.microsoft.com/office/drawing/2014/main" id="{DBE1F978-548F-48AE-8297-6DB05C596EF3}"/>
+              </a:ext>
+            </a:extLst>
+          </p:cNvPr>
+          <p:cNvSpPr txBox="1"/>
+          <p:nvPr/>
+        </p:nvSpPr>
+        <p:spPr>
+          <a:xfrm>
+            <a:off x="1507064" y="4238560"/>
+            <a:ext cx="9616651" cy="584775"/>
+          </a:xfrm>
+          <a:prstGeom prst="rect">
+            <a:avLst/>
+          </a:prstGeom>
+          <a:solidFill>
+            <a:srgbClr val="FFE7B7"/>
+          </a:solidFill>
+          <a:ln w="57150">
+            <a:solidFill>
+              <a:srgbClr val="FFC000"/>
+            </a:solidFill>
+          </a:ln>
+        </p:spPr>
+        <p:txBody>
+          <a:bodyPr wrap="square">
+            <a:spAutoFit/>
+          </a:bodyPr>
+          <a:lstStyle/>
+          <a:p>
+            <a:r>
+              <a:rPr lang="en-US" sz="1600" dirty="0">
+                <a:latin typeface="Segoe UI" panose="020B0502040204020203" pitchFamily="34" charset="0"/>
+                <a:cs typeface="Segoe UI" panose="020B0502040204020203" pitchFamily="34" charset="0"/>
+              </a:rPr>
+              <a:t>Arrow functions inherit their this value from the environment in which they are defined, and that value cannot be overridden with bind(). </a:t>
+            </a:r>
+          </a:p>
+        </p:txBody>
+      </p:sp>
+    </p:spTree>
+    <p:extLst>
+      <p:ext uri="{BB962C8B-B14F-4D97-AF65-F5344CB8AC3E}">
+        <p14:creationId xmlns:p14="http://schemas.microsoft.com/office/powerpoint/2010/main" val="1313316622"/>
+      </p:ext>
+    </p:extLst>
+  </p:cSld>
+  <p:clrMapOvr>
+    <a:masterClrMapping/>
+  </p:clrMapOvr>
+</p:sld>
+</file>
+
+<file path=ppt/slides/slide52.xml><?xml version="1.0" encoding="utf-8"?>
+<p:sld xmlns:a="http://schemas.openxmlformats.org/drawingml/2006/main" xmlns:r="http://schemas.openxmlformats.org/officeDocument/2006/relationships" xmlns:p="http://schemas.openxmlformats.org/presentationml/2006/main">
+  <p:cSld>
+    <p:spTree>
+      <p:nvGrpSpPr>
+        <p:cNvPr id="1" name=""/>
+        <p:cNvGrpSpPr/>
+        <p:nvPr/>
+      </p:nvGrpSpPr>
+      <p:grpSpPr>
+        <a:xfrm>
+          <a:off x="0" y="0"/>
+          <a:ext cx="0" cy="0"/>
+          <a:chOff x="0" y="0"/>
+          <a:chExt cx="0" cy="0"/>
+        </a:xfrm>
+      </p:grpSpPr>
+      <p:sp>
+        <p:nvSpPr>
+          <p:cNvPr id="2" name="Title 1">
+            <a:extLst>
+              <a:ext uri="{FF2B5EF4-FFF2-40B4-BE49-F238E27FC236}">
+                <a16:creationId xmlns:a16="http://schemas.microsoft.com/office/drawing/2014/main" id="{2D4E4121-CDC8-41BA-846E-58655BA90FCF}"/>
+              </a:ext>
+            </a:extLst>
+          </p:cNvPr>
+          <p:cNvSpPr>
+            <a:spLocks noGrp="1"/>
+          </p:cNvSpPr>
+          <p:nvPr>
+            <p:ph type="ctrTitle"/>
+          </p:nvPr>
+        </p:nvSpPr>
+        <p:spPr>
+          <a:xfrm>
+            <a:off x="1507067" y="345351"/>
+            <a:ext cx="7766936" cy="970133"/>
+          </a:xfrm>
+        </p:spPr>
+        <p:txBody>
+          <a:bodyPr/>
+          <a:lstStyle/>
+          <a:p>
+            <a:pPr algn="l"/>
+            <a:r>
+              <a:rPr lang="en-US" dirty="0">
+                <a:solidFill>
+                  <a:schemeClr val="tx1">
+                    <a:lumMod val="85000"/>
+                    <a:lumOff val="15000"/>
+                  </a:schemeClr>
+                </a:solidFill>
+                <a:latin typeface="Segoe UI" panose="020B0502040204020203" pitchFamily="34" charset="0"/>
+                <a:cs typeface="Segoe UI" panose="020B0502040204020203" pitchFamily="34" charset="0"/>
+              </a:rPr>
+              <a:t>JS| </a:t>
+            </a:r>
+            <a:r>
+              <a:rPr lang="en-US" sz="3200" b="1" dirty="0">
+                <a:solidFill>
+                  <a:schemeClr val="tx1">
+                    <a:lumMod val="85000"/>
+                    <a:lumOff val="15000"/>
+                  </a:schemeClr>
+                </a:solidFill>
+                <a:latin typeface="Segoe UI" panose="020B0502040204020203" pitchFamily="34" charset="0"/>
+                <a:cs typeface="Segoe UI" panose="020B0502040204020203" pitchFamily="34" charset="0"/>
+              </a:rPr>
+              <a:t>Functions Methos - </a:t>
+            </a:r>
+            <a:r>
+              <a:rPr lang="en-US" sz="3200" b="1" dirty="0" err="1">
+                <a:solidFill>
+                  <a:schemeClr val="tx1">
+                    <a:lumMod val="85000"/>
+                    <a:lumOff val="15000"/>
+                  </a:schemeClr>
+                </a:solidFill>
+                <a:latin typeface="Segoe UI" panose="020B0502040204020203" pitchFamily="34" charset="0"/>
+                <a:cs typeface="Segoe UI" panose="020B0502040204020203" pitchFamily="34" charset="0"/>
+              </a:rPr>
+              <a:t>ToString</a:t>
+            </a:r>
+            <a:endParaRPr lang="en-US" b="1" dirty="0">
+              <a:solidFill>
+                <a:schemeClr val="tx1">
+                  <a:lumMod val="85000"/>
+                  <a:lumOff val="15000"/>
+                </a:schemeClr>
+              </a:solidFill>
+              <a:latin typeface="Segoe UI" panose="020B0502040204020203" pitchFamily="34" charset="0"/>
+              <a:cs typeface="Segoe UI" panose="020B0502040204020203" pitchFamily="34" charset="0"/>
+            </a:endParaRPr>
+          </a:p>
+        </p:txBody>
+      </p:sp>
+      <p:sp>
+        <p:nvSpPr>
+          <p:cNvPr id="6" name="TextBox 5">
+            <a:extLst>
+              <a:ext uri="{FF2B5EF4-FFF2-40B4-BE49-F238E27FC236}">
+                <a16:creationId xmlns:a16="http://schemas.microsoft.com/office/drawing/2014/main" id="{2B7B81F7-6A0C-41F3-8DFF-FCF27F70557B}"/>
+              </a:ext>
+            </a:extLst>
+          </p:cNvPr>
+          <p:cNvSpPr txBox="1"/>
+          <p:nvPr/>
+        </p:nvSpPr>
+        <p:spPr>
+          <a:xfrm>
+            <a:off x="1507066" y="1643512"/>
+            <a:ext cx="9616652" cy="1815882"/>
+          </a:xfrm>
+          <a:prstGeom prst="rect">
+            <a:avLst/>
+          </a:prstGeom>
+          <a:noFill/>
+        </p:spPr>
+        <p:txBody>
+          <a:bodyPr wrap="square">
+            <a:spAutoFit/>
+          </a:bodyPr>
+          <a:lstStyle/>
+          <a:p>
+            <a:r>
+              <a:rPr lang="en-US" sz="1600" dirty="0">
+                <a:latin typeface="Segoe UI" panose="020B0502040204020203" pitchFamily="34" charset="0"/>
+                <a:cs typeface="Segoe UI" panose="020B0502040204020203" pitchFamily="34" charset="0"/>
+              </a:rPr>
+              <a:t>Like all JavaScript objects, functions have a </a:t>
+            </a:r>
+            <a:r>
+              <a:rPr lang="en-US" sz="1600" dirty="0" err="1">
+                <a:latin typeface="Segoe UI" panose="020B0502040204020203" pitchFamily="34" charset="0"/>
+                <a:cs typeface="Segoe UI" panose="020B0502040204020203" pitchFamily="34" charset="0"/>
+              </a:rPr>
+              <a:t>toString</a:t>
+            </a:r>
+            <a:r>
+              <a:rPr lang="en-US" sz="1600" dirty="0">
+                <a:latin typeface="Segoe UI" panose="020B0502040204020203" pitchFamily="34" charset="0"/>
+                <a:cs typeface="Segoe UI" panose="020B0502040204020203" pitchFamily="34" charset="0"/>
+              </a:rPr>
+              <a:t>() method. </a:t>
+            </a:r>
+          </a:p>
+          <a:p>
+            <a:endParaRPr lang="en-US" sz="1600" dirty="0">
+              <a:latin typeface="Segoe UI" panose="020B0502040204020203" pitchFamily="34" charset="0"/>
+              <a:cs typeface="Segoe UI" panose="020B0502040204020203" pitchFamily="34" charset="0"/>
+            </a:endParaRPr>
+          </a:p>
+          <a:p>
+            <a:r>
+              <a:rPr lang="en-US" sz="1600" dirty="0">
+                <a:latin typeface="Segoe UI" panose="020B0502040204020203" pitchFamily="34" charset="0"/>
+                <a:cs typeface="Segoe UI" panose="020B0502040204020203" pitchFamily="34" charset="0"/>
+              </a:rPr>
+              <a:t>The ECMAScript spec requires this method to return a string that follows the syntax of the function declaration statement. </a:t>
+            </a:r>
+          </a:p>
+          <a:p>
+            <a:endParaRPr lang="en-US" sz="1600" dirty="0">
+              <a:latin typeface="Segoe UI" panose="020B0502040204020203" pitchFamily="34" charset="0"/>
+              <a:cs typeface="Segoe UI" panose="020B0502040204020203" pitchFamily="34" charset="0"/>
+            </a:endParaRPr>
+          </a:p>
+          <a:p>
+            <a:r>
+              <a:rPr lang="en-US" sz="1600" dirty="0">
+                <a:latin typeface="Segoe UI" panose="020B0502040204020203" pitchFamily="34" charset="0"/>
+                <a:cs typeface="Segoe UI" panose="020B0502040204020203" pitchFamily="34" charset="0"/>
+              </a:rPr>
+              <a:t>In practice, most (but not all) implementations of this </a:t>
+            </a:r>
+            <a:r>
+              <a:rPr lang="en-US" sz="1600" dirty="0" err="1">
+                <a:latin typeface="Segoe UI" panose="020B0502040204020203" pitchFamily="34" charset="0"/>
+                <a:cs typeface="Segoe UI" panose="020B0502040204020203" pitchFamily="34" charset="0"/>
+              </a:rPr>
+              <a:t>toString</a:t>
+            </a:r>
+            <a:r>
+              <a:rPr lang="en-US" sz="1600" dirty="0">
+                <a:latin typeface="Segoe UI" panose="020B0502040204020203" pitchFamily="34" charset="0"/>
+                <a:cs typeface="Segoe UI" panose="020B0502040204020203" pitchFamily="34" charset="0"/>
+              </a:rPr>
+              <a:t>() method return the complete source code for the function</a:t>
+            </a:r>
+          </a:p>
+        </p:txBody>
+      </p:sp>
+    </p:spTree>
+    <p:extLst>
+      <p:ext uri="{BB962C8B-B14F-4D97-AF65-F5344CB8AC3E}">
+        <p14:creationId xmlns:p14="http://schemas.microsoft.com/office/powerpoint/2010/main" val="1864523797"/>
+      </p:ext>
+    </p:extLst>
+  </p:cSld>
+  <p:clrMapOvr>
+    <a:masterClrMapping/>
+  </p:clrMapOvr>
+</p:sld>
+</file>
+
+<file path=ppt/slides/slide53.xml><?xml version="1.0" encoding="utf-8"?>
+<p:sld xmlns:a="http://schemas.openxmlformats.org/drawingml/2006/main" xmlns:r="http://schemas.openxmlformats.org/officeDocument/2006/relationships" xmlns:p="http://schemas.openxmlformats.org/presentationml/2006/main">
+  <p:cSld>
+    <p:spTree>
+      <p:nvGrpSpPr>
+        <p:cNvPr id="1" name=""/>
+        <p:cNvGrpSpPr/>
+        <p:nvPr/>
+      </p:nvGrpSpPr>
+      <p:grpSpPr>
+        <a:xfrm>
+          <a:off x="0" y="0"/>
+          <a:ext cx="0" cy="0"/>
+          <a:chOff x="0" y="0"/>
+          <a:chExt cx="0" cy="0"/>
+        </a:xfrm>
+      </p:grpSpPr>
+      <p:sp>
+        <p:nvSpPr>
+          <p:cNvPr id="2" name="Title 1">
+            <a:extLst>
+              <a:ext uri="{FF2B5EF4-FFF2-40B4-BE49-F238E27FC236}">
+                <a16:creationId xmlns:a16="http://schemas.microsoft.com/office/drawing/2014/main" id="{2D4E4121-CDC8-41BA-846E-58655BA90FCF}"/>
+              </a:ext>
+            </a:extLst>
+          </p:cNvPr>
+          <p:cNvSpPr>
+            <a:spLocks noGrp="1"/>
+          </p:cNvSpPr>
+          <p:nvPr>
+            <p:ph type="ctrTitle"/>
+          </p:nvPr>
+        </p:nvSpPr>
+        <p:spPr>
+          <a:xfrm>
+            <a:off x="1507067" y="345351"/>
+            <a:ext cx="7766936" cy="970133"/>
+          </a:xfrm>
+        </p:spPr>
+        <p:txBody>
+          <a:bodyPr/>
+          <a:lstStyle/>
+          <a:p>
+            <a:pPr algn="l"/>
+            <a:r>
+              <a:rPr lang="en-US" dirty="0">
+                <a:solidFill>
+                  <a:schemeClr val="tx1">
+                    <a:lumMod val="85000"/>
+                    <a:lumOff val="15000"/>
+                  </a:schemeClr>
+                </a:solidFill>
+                <a:latin typeface="Segoe UI" panose="020B0502040204020203" pitchFamily="34" charset="0"/>
+                <a:cs typeface="Segoe UI" panose="020B0502040204020203" pitchFamily="34" charset="0"/>
+              </a:rPr>
+              <a:t>JS| </a:t>
+            </a:r>
+            <a:r>
+              <a:rPr lang="en-US" sz="3200" b="1" dirty="0">
+                <a:solidFill>
+                  <a:schemeClr val="tx1">
+                    <a:lumMod val="85000"/>
+                    <a:lumOff val="15000"/>
+                  </a:schemeClr>
+                </a:solidFill>
+                <a:latin typeface="Segoe UI" panose="020B0502040204020203" pitchFamily="34" charset="0"/>
+                <a:cs typeface="Segoe UI" panose="020B0502040204020203" pitchFamily="34" charset="0"/>
+              </a:rPr>
+              <a:t>Functions Constructor</a:t>
+            </a:r>
+            <a:endParaRPr lang="en-US" b="1" dirty="0">
+              <a:solidFill>
+                <a:schemeClr val="tx1">
+                  <a:lumMod val="85000"/>
+                  <a:lumOff val="15000"/>
+                </a:schemeClr>
+              </a:solidFill>
+              <a:latin typeface="Segoe UI" panose="020B0502040204020203" pitchFamily="34" charset="0"/>
+              <a:cs typeface="Segoe UI" panose="020B0502040204020203" pitchFamily="34" charset="0"/>
+            </a:endParaRPr>
+          </a:p>
+        </p:txBody>
+      </p:sp>
+      <p:sp>
+        <p:nvSpPr>
+          <p:cNvPr id="6" name="TextBox 5">
+            <a:extLst>
+              <a:ext uri="{FF2B5EF4-FFF2-40B4-BE49-F238E27FC236}">
+                <a16:creationId xmlns:a16="http://schemas.microsoft.com/office/drawing/2014/main" id="{2B7B81F7-6A0C-41F3-8DFF-FCF27F70557B}"/>
+              </a:ext>
+            </a:extLst>
+          </p:cNvPr>
+          <p:cNvSpPr txBox="1"/>
+          <p:nvPr/>
+        </p:nvSpPr>
+        <p:spPr>
+          <a:xfrm>
+            <a:off x="1507066" y="1643512"/>
+            <a:ext cx="9616652" cy="1569660"/>
+          </a:xfrm>
+          <a:prstGeom prst="rect">
+            <a:avLst/>
+          </a:prstGeom>
+          <a:noFill/>
+        </p:spPr>
+        <p:txBody>
+          <a:bodyPr wrap="square">
+            <a:spAutoFit/>
+          </a:bodyPr>
+          <a:lstStyle/>
+          <a:p>
+            <a:r>
+              <a:rPr lang="en-US" sz="1600" dirty="0">
+                <a:latin typeface="Segoe UI" panose="020B0502040204020203" pitchFamily="34" charset="0"/>
+                <a:cs typeface="Segoe UI" panose="020B0502040204020203" pitchFamily="34" charset="0"/>
+              </a:rPr>
+              <a:t>The primary purpose of bind() is to </a:t>
+            </a:r>
+            <a:r>
+              <a:rPr lang="en-US" sz="1600" b="1" dirty="0">
+                <a:latin typeface="Segoe UI" panose="020B0502040204020203" pitchFamily="34" charset="0"/>
+                <a:cs typeface="Segoe UI" panose="020B0502040204020203" pitchFamily="34" charset="0"/>
+              </a:rPr>
+              <a:t>bind</a:t>
+            </a:r>
+            <a:r>
+              <a:rPr lang="en-US" sz="1600" dirty="0">
+                <a:latin typeface="Segoe UI" panose="020B0502040204020203" pitchFamily="34" charset="0"/>
+                <a:cs typeface="Segoe UI" panose="020B0502040204020203" pitchFamily="34" charset="0"/>
+              </a:rPr>
+              <a:t> a </a:t>
+            </a:r>
+            <a:r>
+              <a:rPr lang="en-US" sz="1600" b="1" dirty="0">
+                <a:latin typeface="Segoe UI" panose="020B0502040204020203" pitchFamily="34" charset="0"/>
+                <a:cs typeface="Segoe UI" panose="020B0502040204020203" pitchFamily="34" charset="0"/>
+              </a:rPr>
+              <a:t>function</a:t>
+            </a:r>
+            <a:r>
+              <a:rPr lang="en-US" sz="1600" dirty="0">
+                <a:latin typeface="Segoe UI" panose="020B0502040204020203" pitchFamily="34" charset="0"/>
+                <a:cs typeface="Segoe UI" panose="020B0502040204020203" pitchFamily="34" charset="0"/>
+              </a:rPr>
+              <a:t> to an </a:t>
+            </a:r>
+            <a:r>
+              <a:rPr lang="en-US" sz="1600" b="1" dirty="0">
+                <a:latin typeface="Segoe UI" panose="020B0502040204020203" pitchFamily="34" charset="0"/>
+                <a:cs typeface="Segoe UI" panose="020B0502040204020203" pitchFamily="34" charset="0"/>
+              </a:rPr>
+              <a:t>object</a:t>
+            </a:r>
+            <a:r>
+              <a:rPr lang="en-US" sz="1600" dirty="0">
+                <a:latin typeface="Segoe UI" panose="020B0502040204020203" pitchFamily="34" charset="0"/>
+                <a:cs typeface="Segoe UI" panose="020B0502040204020203" pitchFamily="34" charset="0"/>
+              </a:rPr>
+              <a:t>. </a:t>
+            </a:r>
+          </a:p>
+          <a:p>
+            <a:endParaRPr lang="en-US" sz="1600" dirty="0">
+              <a:latin typeface="Segoe UI" panose="020B0502040204020203" pitchFamily="34" charset="0"/>
+              <a:cs typeface="Segoe UI" panose="020B0502040204020203" pitchFamily="34" charset="0"/>
+            </a:endParaRPr>
+          </a:p>
+          <a:p>
+            <a:r>
+              <a:rPr lang="en-US" sz="1600" dirty="0">
+                <a:latin typeface="Segoe UI" panose="020B0502040204020203" pitchFamily="34" charset="0"/>
+                <a:cs typeface="Segoe UI" panose="020B0502040204020203" pitchFamily="34" charset="0"/>
+              </a:rPr>
+              <a:t>When you </a:t>
+            </a:r>
+            <a:r>
+              <a:rPr lang="en-US" sz="1600" b="1" dirty="0">
+                <a:latin typeface="Segoe UI" panose="020B0502040204020203" pitchFamily="34" charset="0"/>
+                <a:cs typeface="Segoe UI" panose="020B0502040204020203" pitchFamily="34" charset="0"/>
+              </a:rPr>
+              <a:t>invoke</a:t>
+            </a:r>
+            <a:r>
+              <a:rPr lang="en-US" sz="1600" dirty="0">
+                <a:latin typeface="Segoe UI" panose="020B0502040204020203" pitchFamily="34" charset="0"/>
+                <a:cs typeface="Segoe UI" panose="020B0502040204020203" pitchFamily="34" charset="0"/>
+              </a:rPr>
+              <a:t> the </a:t>
+            </a:r>
+            <a:r>
+              <a:rPr lang="en-US" sz="1600" b="1" dirty="0">
+                <a:latin typeface="Segoe UI" panose="020B0502040204020203" pitchFamily="34" charset="0"/>
+                <a:cs typeface="Segoe UI" panose="020B0502040204020203" pitchFamily="34" charset="0"/>
+              </a:rPr>
+              <a:t>bind</a:t>
+            </a:r>
+            <a:r>
+              <a:rPr lang="en-US" sz="1600" dirty="0">
+                <a:latin typeface="Segoe UI" panose="020B0502040204020203" pitchFamily="34" charset="0"/>
+                <a:cs typeface="Segoe UI" panose="020B0502040204020203" pitchFamily="34" charset="0"/>
+              </a:rPr>
+              <a:t>() method on a </a:t>
+            </a:r>
+            <a:r>
+              <a:rPr lang="en-US" sz="1600" b="1" dirty="0">
+                <a:latin typeface="Segoe UI" panose="020B0502040204020203" pitchFamily="34" charset="0"/>
+                <a:cs typeface="Segoe UI" panose="020B0502040204020203" pitchFamily="34" charset="0"/>
+              </a:rPr>
+              <a:t>function</a:t>
+            </a:r>
+            <a:r>
+              <a:rPr lang="en-US" sz="1600" dirty="0">
+                <a:latin typeface="Segoe UI" panose="020B0502040204020203" pitchFamily="34" charset="0"/>
+                <a:cs typeface="Segoe UI" panose="020B0502040204020203" pitchFamily="34" charset="0"/>
+              </a:rPr>
+              <a:t> f and pass an </a:t>
+            </a:r>
+            <a:r>
+              <a:rPr lang="en-US" sz="1600" b="1" dirty="0">
+                <a:latin typeface="Segoe UI" panose="020B0502040204020203" pitchFamily="34" charset="0"/>
+                <a:cs typeface="Segoe UI" panose="020B0502040204020203" pitchFamily="34" charset="0"/>
+              </a:rPr>
+              <a:t>object</a:t>
+            </a:r>
+            <a:r>
+              <a:rPr lang="en-US" sz="1600" dirty="0">
+                <a:latin typeface="Segoe UI" panose="020B0502040204020203" pitchFamily="34" charset="0"/>
+                <a:cs typeface="Segoe UI" panose="020B0502040204020203" pitchFamily="34" charset="0"/>
+              </a:rPr>
+              <a:t> o, the method returns a new function. </a:t>
+            </a:r>
+          </a:p>
+          <a:p>
+            <a:endParaRPr lang="en-US" sz="1600" dirty="0">
+              <a:latin typeface="Segoe UI" panose="020B0502040204020203" pitchFamily="34" charset="0"/>
+              <a:cs typeface="Segoe UI" panose="020B0502040204020203" pitchFamily="34" charset="0"/>
+            </a:endParaRPr>
+          </a:p>
+          <a:p>
+            <a:r>
+              <a:rPr lang="en-US" sz="1600" dirty="0">
+                <a:latin typeface="Segoe UI" panose="020B0502040204020203" pitchFamily="34" charset="0"/>
+                <a:cs typeface="Segoe UI" panose="020B0502040204020203" pitchFamily="34" charset="0"/>
+              </a:rPr>
+              <a:t>Invoking the new function (as a function) </a:t>
+            </a:r>
+            <a:r>
+              <a:rPr lang="en-US" sz="1600" b="1" dirty="0">
+                <a:latin typeface="Segoe UI" panose="020B0502040204020203" pitchFamily="34" charset="0"/>
+                <a:cs typeface="Segoe UI" panose="020B0502040204020203" pitchFamily="34" charset="0"/>
+              </a:rPr>
+              <a:t>invokes</a:t>
+            </a:r>
+            <a:r>
+              <a:rPr lang="en-US" sz="1600" dirty="0">
+                <a:latin typeface="Segoe UI" panose="020B0502040204020203" pitchFamily="34" charset="0"/>
+                <a:cs typeface="Segoe UI" panose="020B0502040204020203" pitchFamily="34" charset="0"/>
+              </a:rPr>
+              <a:t> the </a:t>
+            </a:r>
+            <a:r>
+              <a:rPr lang="en-US" sz="1600" b="1" dirty="0">
+                <a:latin typeface="Segoe UI" panose="020B0502040204020203" pitchFamily="34" charset="0"/>
+                <a:cs typeface="Segoe UI" panose="020B0502040204020203" pitchFamily="34" charset="0"/>
+              </a:rPr>
+              <a:t>original function </a:t>
+            </a:r>
+            <a:r>
+              <a:rPr lang="en-US" sz="1600" dirty="0">
+                <a:latin typeface="Segoe UI" panose="020B0502040204020203" pitchFamily="34" charset="0"/>
+                <a:cs typeface="Segoe UI" panose="020B0502040204020203" pitchFamily="34" charset="0"/>
+              </a:rPr>
+              <a:t>f as a </a:t>
+            </a:r>
+            <a:r>
+              <a:rPr lang="en-US" sz="1600" b="1" dirty="0">
+                <a:latin typeface="Segoe UI" panose="020B0502040204020203" pitchFamily="34" charset="0"/>
+                <a:cs typeface="Segoe UI" panose="020B0502040204020203" pitchFamily="34" charset="0"/>
+              </a:rPr>
+              <a:t>method</a:t>
+            </a:r>
+            <a:r>
+              <a:rPr lang="en-US" sz="1600" dirty="0">
+                <a:latin typeface="Segoe UI" panose="020B0502040204020203" pitchFamily="34" charset="0"/>
+                <a:cs typeface="Segoe UI" panose="020B0502040204020203" pitchFamily="34" charset="0"/>
+              </a:rPr>
+              <a:t> of </a:t>
+            </a:r>
+            <a:r>
+              <a:rPr lang="en-US" sz="1600" b="1" dirty="0">
+                <a:latin typeface="Segoe UI" panose="020B0502040204020203" pitchFamily="34" charset="0"/>
+                <a:cs typeface="Segoe UI" panose="020B0502040204020203" pitchFamily="34" charset="0"/>
+              </a:rPr>
+              <a:t>o</a:t>
+            </a:r>
+            <a:r>
+              <a:rPr lang="en-US" sz="1600" dirty="0">
+                <a:latin typeface="Segoe UI" panose="020B0502040204020203" pitchFamily="34" charset="0"/>
+                <a:cs typeface="Segoe UI" panose="020B0502040204020203" pitchFamily="34" charset="0"/>
+              </a:rPr>
+              <a:t>.</a:t>
+            </a:r>
+          </a:p>
+        </p:txBody>
+      </p:sp>
+    </p:spTree>
+    <p:extLst>
+      <p:ext uri="{BB962C8B-B14F-4D97-AF65-F5344CB8AC3E}">
+        <p14:creationId xmlns:p14="http://schemas.microsoft.com/office/powerpoint/2010/main" val="1962931493"/>
+      </p:ext>
+    </p:extLst>
+  </p:cSld>
+  <p:clrMapOvr>
+    <a:masterClrMapping/>
+  </p:clrMapOvr>
+</p:sld>
+</file>
+
+<file path=ppt/slides/slide54.xml><?xml version="1.0" encoding="utf-8"?>
+<p:sld xmlns:a="http://schemas.openxmlformats.org/drawingml/2006/main" xmlns:r="http://schemas.openxmlformats.org/officeDocument/2006/relationships" xmlns:p="http://schemas.openxmlformats.org/presentationml/2006/main">
+  <p:cSld>
+    <p:spTree>
+      <p:nvGrpSpPr>
+        <p:cNvPr id="1" name=""/>
+        <p:cNvGrpSpPr/>
+        <p:nvPr/>
+      </p:nvGrpSpPr>
+      <p:grpSpPr>
+        <a:xfrm>
+          <a:off x="0" y="0"/>
+          <a:ext cx="0" cy="0"/>
+          <a:chOff x="0" y="0"/>
+          <a:chExt cx="0" cy="0"/>
+        </a:xfrm>
+      </p:grpSpPr>
+      <p:sp>
+        <p:nvSpPr>
+          <p:cNvPr id="2" name="Title 1">
+            <a:extLst>
+              <a:ext uri="{FF2B5EF4-FFF2-40B4-BE49-F238E27FC236}">
+                <a16:creationId xmlns:a16="http://schemas.microsoft.com/office/drawing/2014/main" id="{2D4E4121-CDC8-41BA-846E-58655BA90FCF}"/>
+              </a:ext>
+            </a:extLst>
+          </p:cNvPr>
+          <p:cNvSpPr>
+            <a:spLocks noGrp="1"/>
+          </p:cNvSpPr>
+          <p:nvPr>
+            <p:ph type="ctrTitle"/>
+          </p:nvPr>
+        </p:nvSpPr>
+        <p:spPr>
+          <a:xfrm>
+            <a:off x="1507067" y="345351"/>
+            <a:ext cx="7766936" cy="970133"/>
+          </a:xfrm>
+        </p:spPr>
+        <p:txBody>
+          <a:bodyPr/>
+          <a:lstStyle/>
+          <a:p>
+            <a:pPr algn="l"/>
+            <a:r>
+              <a:rPr lang="en-US" dirty="0">
+                <a:solidFill>
+                  <a:schemeClr val="tx1">
+                    <a:lumMod val="85000"/>
+                    <a:lumOff val="15000"/>
+                  </a:schemeClr>
+                </a:solidFill>
+                <a:latin typeface="Segoe UI" panose="020B0502040204020203" pitchFamily="34" charset="0"/>
+                <a:cs typeface="Segoe UI" panose="020B0502040204020203" pitchFamily="34" charset="0"/>
+              </a:rPr>
+              <a:t>JS| </a:t>
+            </a:r>
+            <a:r>
+              <a:rPr lang="en-US" sz="3200" b="1" dirty="0">
+                <a:solidFill>
+                  <a:schemeClr val="tx1">
+                    <a:lumMod val="85000"/>
+                    <a:lumOff val="15000"/>
+                  </a:schemeClr>
+                </a:solidFill>
+                <a:latin typeface="Segoe UI" panose="020B0502040204020203" pitchFamily="34" charset="0"/>
+                <a:cs typeface="Segoe UI" panose="020B0502040204020203" pitchFamily="34" charset="0"/>
+              </a:rPr>
               <a:t>Classes</a:t>
             </a:r>
             <a:endParaRPr lang="en-US" b="1" dirty="0">
@@ -30592,254 +34247,6 @@
     <p:extLst>
       <p:ext uri="{BB962C8B-B14F-4D97-AF65-F5344CB8AC3E}">
         <p14:creationId xmlns:p14="http://schemas.microsoft.com/office/powerpoint/2010/main" val="1795469329"/>
-      </p:ext>
-    </p:extLst>
-  </p:cSld>
-  <p:clrMapOvr>
-    <a:masterClrMapping/>
-  </p:clrMapOvr>
-</p:sld>
-</file>
-
-<file path=ppt/slides/slide5.xml><?xml version="1.0" encoding="utf-8"?>
-<p:sld xmlns:a="http://schemas.openxmlformats.org/drawingml/2006/main" xmlns:r="http://schemas.openxmlformats.org/officeDocument/2006/relationships" xmlns:p="http://schemas.openxmlformats.org/presentationml/2006/main">
-  <p:cSld>
-    <p:spTree>
-      <p:nvGrpSpPr>
-        <p:cNvPr id="1" name=""/>
-        <p:cNvGrpSpPr/>
-        <p:nvPr/>
-      </p:nvGrpSpPr>
-      <p:grpSpPr>
-        <a:xfrm>
-          <a:off x="0" y="0"/>
-          <a:ext cx="0" cy="0"/>
-          <a:chOff x="0" y="0"/>
-          <a:chExt cx="0" cy="0"/>
-        </a:xfrm>
-      </p:grpSpPr>
-      <p:sp>
-        <p:nvSpPr>
-          <p:cNvPr id="6" name="TextBox 5">
-            <a:extLst>
-              <a:ext uri="{FF2B5EF4-FFF2-40B4-BE49-F238E27FC236}">
-                <a16:creationId xmlns:a16="http://schemas.microsoft.com/office/drawing/2014/main" id="{58347EA0-F5FD-4C3F-8B86-AD1D1071EF8B}"/>
-              </a:ext>
-            </a:extLst>
-          </p:cNvPr>
-          <p:cNvSpPr txBox="1"/>
-          <p:nvPr/>
-        </p:nvSpPr>
-        <p:spPr>
-          <a:xfrm>
-            <a:off x="1507066" y="2564605"/>
-            <a:ext cx="9489586" cy="923330"/>
-          </a:xfrm>
-          <a:prstGeom prst="rect">
-            <a:avLst/>
-          </a:prstGeom>
-          <a:solidFill>
-            <a:schemeClr val="accent3">
-              <a:lumMod val="60000"/>
-              <a:lumOff val="40000"/>
-            </a:schemeClr>
-          </a:solidFill>
-          <a:ln w="57150">
-            <a:solidFill>
-              <a:srgbClr val="00B050"/>
-            </a:solidFill>
-          </a:ln>
-        </p:spPr>
-        <p:txBody>
-          <a:bodyPr wrap="square">
-            <a:spAutoFit/>
-          </a:bodyPr>
-          <a:lstStyle/>
-          <a:p>
-            <a:r>
-              <a:rPr lang="en-US" b="1" dirty="0">
-                <a:latin typeface="Segoe UI" panose="020B0502040204020203" pitchFamily="34" charset="0"/>
-                <a:cs typeface="Segoe UI" panose="020B0502040204020203" pitchFamily="34" charset="0"/>
-              </a:rPr>
-              <a:t>EXECUTION-CONTEXT:</a:t>
-            </a:r>
-          </a:p>
-          <a:p>
-            <a:endParaRPr lang="en-US" dirty="0">
-              <a:latin typeface="Segoe UI" panose="020B0502040204020203" pitchFamily="34" charset="0"/>
-              <a:cs typeface="Segoe UI" panose="020B0502040204020203" pitchFamily="34" charset="0"/>
-            </a:endParaRPr>
-          </a:p>
-          <a:p>
-            <a:r>
-              <a:rPr lang="en-US" dirty="0">
-                <a:latin typeface="Segoe UI" panose="020B0502040204020203" pitchFamily="34" charset="0"/>
-                <a:cs typeface="Segoe UI" panose="020B0502040204020203" pitchFamily="34" charset="0"/>
-              </a:rPr>
-              <a:t>They defining their own invocation context.</a:t>
-            </a:r>
-          </a:p>
-        </p:txBody>
-      </p:sp>
-      <p:sp>
-        <p:nvSpPr>
-          <p:cNvPr id="9" name="TextBox 8">
-            <a:extLst>
-              <a:ext uri="{FF2B5EF4-FFF2-40B4-BE49-F238E27FC236}">
-                <a16:creationId xmlns:a16="http://schemas.microsoft.com/office/drawing/2014/main" id="{0E5D8058-EB78-4D5B-B4C3-0B087F783CEE}"/>
-              </a:ext>
-            </a:extLst>
-          </p:cNvPr>
-          <p:cNvSpPr txBox="1"/>
-          <p:nvPr/>
-        </p:nvSpPr>
-        <p:spPr>
-          <a:xfrm>
-            <a:off x="1507066" y="1616879"/>
-            <a:ext cx="9489586" cy="646331"/>
-          </a:xfrm>
-          <a:prstGeom prst="rect">
-            <a:avLst/>
-          </a:prstGeom>
-          <a:solidFill>
-            <a:srgbClr val="F6B3AA"/>
-          </a:solidFill>
-          <a:ln w="57150">
-            <a:solidFill>
-              <a:srgbClr val="C00000"/>
-            </a:solidFill>
-          </a:ln>
-        </p:spPr>
-        <p:txBody>
-          <a:bodyPr wrap="square">
-            <a:spAutoFit/>
-          </a:bodyPr>
-          <a:lstStyle/>
-          <a:p>
-            <a:r>
-              <a:rPr lang="en-US" dirty="0">
-                <a:latin typeface="Segoe UI" panose="020B0502040204020203" pitchFamily="34" charset="0"/>
-                <a:cs typeface="Segoe UI" panose="020B0502040204020203" pitchFamily="34" charset="0"/>
-              </a:rPr>
-              <a:t>They </a:t>
-            </a:r>
-            <a:r>
-              <a:rPr lang="en-US" b="1" dirty="0">
-                <a:latin typeface="Segoe UI" panose="020B0502040204020203" pitchFamily="34" charset="0"/>
-                <a:cs typeface="Segoe UI" panose="020B0502040204020203" pitchFamily="34" charset="0"/>
-              </a:rPr>
-              <a:t>have a prototype property, </a:t>
-            </a:r>
-            <a:r>
-              <a:rPr lang="en-US" dirty="0">
-                <a:latin typeface="Segoe UI" panose="020B0502040204020203" pitchFamily="34" charset="0"/>
-                <a:cs typeface="Segoe UI" panose="020B0502040204020203" pitchFamily="34" charset="0"/>
-              </a:rPr>
-              <a:t>which means that they can be used as constructor functions for new classes.</a:t>
-            </a:r>
-          </a:p>
-        </p:txBody>
-      </p:sp>
-      <p:sp>
-        <p:nvSpPr>
-          <p:cNvPr id="2" name="Title 1">
-            <a:extLst>
-              <a:ext uri="{FF2B5EF4-FFF2-40B4-BE49-F238E27FC236}">
-                <a16:creationId xmlns:a16="http://schemas.microsoft.com/office/drawing/2014/main" id="{2D4E4121-CDC8-41BA-846E-58655BA90FCF}"/>
-              </a:ext>
-            </a:extLst>
-          </p:cNvPr>
-          <p:cNvSpPr>
-            <a:spLocks noGrp="1"/>
-          </p:cNvSpPr>
-          <p:nvPr>
-            <p:ph type="ctrTitle"/>
-          </p:nvPr>
-        </p:nvSpPr>
-        <p:spPr>
-          <a:xfrm>
-            <a:off x="1507067" y="345351"/>
-            <a:ext cx="7766936" cy="970133"/>
-          </a:xfrm>
-        </p:spPr>
-        <p:txBody>
-          <a:bodyPr/>
-          <a:lstStyle/>
-          <a:p>
-            <a:pPr algn="l"/>
-            <a:r>
-              <a:rPr lang="en-US" dirty="0">
-                <a:solidFill>
-                  <a:schemeClr val="tx1">
-                    <a:lumMod val="85000"/>
-                    <a:lumOff val="15000"/>
-                  </a:schemeClr>
-                </a:solidFill>
-                <a:latin typeface="Segoe UI" panose="020B0502040204020203" pitchFamily="34" charset="0"/>
-                <a:cs typeface="Segoe UI" panose="020B0502040204020203" pitchFamily="34" charset="0"/>
-              </a:rPr>
-              <a:t>JS| </a:t>
-            </a:r>
-            <a:r>
-              <a:rPr lang="en-US" sz="3200" b="1" dirty="0">
-                <a:solidFill>
-                  <a:schemeClr val="tx1">
-                    <a:lumMod val="85000"/>
-                    <a:lumOff val="15000"/>
-                  </a:schemeClr>
-                </a:solidFill>
-                <a:latin typeface="Segoe UI" panose="020B0502040204020203" pitchFamily="34" charset="0"/>
-                <a:cs typeface="Segoe UI" panose="020B0502040204020203" pitchFamily="34" charset="0"/>
-              </a:rPr>
-              <a:t>Functions Declaration</a:t>
-            </a:r>
-            <a:endParaRPr lang="en-US" b="1" dirty="0">
-              <a:solidFill>
-                <a:schemeClr val="tx1">
-                  <a:lumMod val="85000"/>
-                  <a:lumOff val="15000"/>
-                </a:schemeClr>
-              </a:solidFill>
-              <a:latin typeface="Segoe UI" panose="020B0502040204020203" pitchFamily="34" charset="0"/>
-              <a:cs typeface="Segoe UI" panose="020B0502040204020203" pitchFamily="34" charset="0"/>
-            </a:endParaRPr>
-          </a:p>
-        </p:txBody>
-      </p:sp>
-      <p:pic>
-        <p:nvPicPr>
-          <p:cNvPr id="7" name="Picture 6">
-            <a:extLst>
-              <a:ext uri="{FF2B5EF4-FFF2-40B4-BE49-F238E27FC236}">
-                <a16:creationId xmlns:a16="http://schemas.microsoft.com/office/drawing/2014/main" id="{0DF3C225-5C88-461B-8E3B-80625D0C8597}"/>
-              </a:ext>
-            </a:extLst>
-          </p:cNvPr>
-          <p:cNvPicPr>
-            <a:picLocks noChangeAspect="1"/>
-          </p:cNvPicPr>
-          <p:nvPr/>
-        </p:nvPicPr>
-        <p:blipFill>
-          <a:blip r:embed="rId3"/>
-          <a:stretch>
-            <a:fillRect/>
-          </a:stretch>
-        </p:blipFill>
-        <p:spPr>
-          <a:xfrm>
-            <a:off x="541537" y="2489985"/>
-            <a:ext cx="1079515" cy="1079515"/>
-          </a:xfrm>
-          <a:prstGeom prst="rect">
-            <a:avLst/>
-          </a:prstGeom>
-        </p:spPr>
-      </p:pic>
-    </p:spTree>
-    <p:extLst>
-      <p:ext uri="{BB962C8B-B14F-4D97-AF65-F5344CB8AC3E}">
-        <p14:creationId xmlns:p14="http://schemas.microsoft.com/office/powerpoint/2010/main" val="1827091788"/>
       </p:ext>
     </p:extLst>
   </p:cSld>

</xml_diff>